<commit_message>
update the over ride section.
</commit_message>
<xml_diff>
--- a/OT_System_Attack_Case_Study/Railway_Signaling/img/designDoc.pptx
+++ b/OT_System_Attack_Case_Study/Railway_Signaling/img/designDoc.pptx
@@ -5,7 +5,7 @@
     <p:sldMasterId id="2147483648" r:id="rId1"/>
   </p:sldMasterIdLst>
   <p:notesMasterIdLst>
-    <p:notesMasterId r:id="rId11"/>
+    <p:notesMasterId r:id="rId12"/>
   </p:notesMasterIdLst>
   <p:sldIdLst>
     <p:sldId id="256" r:id="rId2"/>
@@ -17,6 +17,7 @@
     <p:sldId id="261" r:id="rId8"/>
     <p:sldId id="263" r:id="rId9"/>
     <p:sldId id="267" r:id="rId10"/>
+    <p:sldId id="268" r:id="rId11"/>
   </p:sldIdLst>
   <p:sldSz cx="12192000" cy="6858000"/>
   <p:notesSz cx="6858000" cy="9144000"/>
@@ -548,6 +549,90 @@
     <p:extLst>
       <p:ext uri="{BB962C8B-B14F-4D97-AF65-F5344CB8AC3E}">
         <p14:creationId xmlns:p14="http://schemas.microsoft.com/office/powerpoint/2010/main" val="1961498462"/>
+      </p:ext>
+    </p:extLst>
+  </p:cSld>
+  <p:clrMapOvr>
+    <a:masterClrMapping/>
+  </p:clrMapOvr>
+</p:notes>
+</file>
+
+<file path=ppt/notesSlides/notesSlide2.xml><?xml version="1.0" encoding="utf-8"?>
+<p:notes xmlns:a="http://schemas.openxmlformats.org/drawingml/2006/main" xmlns:r="http://schemas.openxmlformats.org/officeDocument/2006/relationships" xmlns:p="http://schemas.openxmlformats.org/presentationml/2006/main">
+  <p:cSld>
+    <p:spTree>
+      <p:nvGrpSpPr>
+        <p:cNvPr id="1" name=""/>
+        <p:cNvGrpSpPr/>
+        <p:nvPr/>
+      </p:nvGrpSpPr>
+      <p:grpSpPr>
+        <a:xfrm>
+          <a:off x="0" y="0"/>
+          <a:ext cx="0" cy="0"/>
+          <a:chOff x="0" y="0"/>
+          <a:chExt cx="0" cy="0"/>
+        </a:xfrm>
+      </p:grpSpPr>
+      <p:sp>
+        <p:nvSpPr>
+          <p:cNvPr id="2" name="Slide Image Placeholder 1"/>
+          <p:cNvSpPr>
+            <a:spLocks noGrp="1" noRot="1" noChangeAspect="1"/>
+          </p:cNvSpPr>
+          <p:nvPr>
+            <p:ph type="sldImg"/>
+          </p:nvPr>
+        </p:nvSpPr>
+        <p:spPr/>
+      </p:sp>
+      <p:sp>
+        <p:nvSpPr>
+          <p:cNvPr id="3" name="Notes Placeholder 2"/>
+          <p:cNvSpPr>
+            <a:spLocks noGrp="1"/>
+          </p:cNvSpPr>
+          <p:nvPr>
+            <p:ph type="body" idx="1"/>
+          </p:nvPr>
+        </p:nvSpPr>
+        <p:spPr/>
+        <p:txBody>
+          <a:bodyPr/>
+          <a:lstStyle/>
+          <a:p>
+            <a:endParaRPr lang="en-SG" dirty="0"/>
+          </a:p>
+        </p:txBody>
+      </p:sp>
+      <p:sp>
+        <p:nvSpPr>
+          <p:cNvPr id="4" name="Slide Number Placeholder 3"/>
+          <p:cNvSpPr>
+            <a:spLocks noGrp="1"/>
+          </p:cNvSpPr>
+          <p:nvPr>
+            <p:ph type="sldNum" sz="quarter" idx="5"/>
+          </p:nvPr>
+        </p:nvSpPr>
+        <p:spPr/>
+        <p:txBody>
+          <a:bodyPr/>
+          <a:lstStyle/>
+          <a:p>
+            <a:fld id="{0619E7A7-CE71-44B2-90E3-D9C359A51CC5}" type="slidenum">
+              <a:rPr lang="en-SG" smtClean="0"/>
+              <a:t>10</a:t>
+            </a:fld>
+            <a:endParaRPr lang="en-SG"/>
+          </a:p>
+        </p:txBody>
+      </p:sp>
+    </p:spTree>
+    <p:extLst>
+      <p:ext uri="{BB962C8B-B14F-4D97-AF65-F5344CB8AC3E}">
+        <p14:creationId xmlns:p14="http://schemas.microsoft.com/office/powerpoint/2010/main" val="3584448199"/>
       </p:ext>
     </p:extLst>
   </p:cSld>
@@ -3945,6 +4030,3608 @@
 </p:sld>
 </file>
 
+<file path=ppt/slides/slide10.xml><?xml version="1.0" encoding="utf-8"?>
+<p:sld xmlns:a="http://schemas.openxmlformats.org/drawingml/2006/main" xmlns:r="http://schemas.openxmlformats.org/officeDocument/2006/relationships" xmlns:p="http://schemas.openxmlformats.org/presentationml/2006/main">
+  <p:cSld>
+    <p:spTree>
+      <p:nvGrpSpPr>
+        <p:cNvPr id="1" name=""/>
+        <p:cNvGrpSpPr/>
+        <p:nvPr/>
+      </p:nvGrpSpPr>
+      <p:grpSpPr>
+        <a:xfrm>
+          <a:off x="0" y="0"/>
+          <a:ext cx="0" cy="0"/>
+          <a:chOff x="0" y="0"/>
+          <a:chExt cx="0" cy="0"/>
+        </a:xfrm>
+      </p:grpSpPr>
+      <p:pic>
+        <p:nvPicPr>
+          <p:cNvPr id="4" name="Graphic 3" descr="Wireless router with solid fill">
+            <a:extLst>
+              <a:ext uri="{FF2B5EF4-FFF2-40B4-BE49-F238E27FC236}">
+                <a16:creationId xmlns:a16="http://schemas.microsoft.com/office/drawing/2014/main" id="{EAA85D6A-22C7-79B5-90E3-C74AB5ADF9B6}"/>
+              </a:ext>
+            </a:extLst>
+          </p:cNvPr>
+          <p:cNvPicPr>
+            <a:picLocks noChangeAspect="1"/>
+          </p:cNvPicPr>
+          <p:nvPr/>
+        </p:nvPicPr>
+        <p:blipFill>
+          <a:blip r:embed="rId3">
+            <a:extLst>
+              <a:ext uri="{96DAC541-7B7A-43D3-8B79-37D633B846F1}">
+                <asvg:svgBlip xmlns:asvg="http://schemas.microsoft.com/office/drawing/2016/SVG/main" r:embed="rId4"/>
+              </a:ext>
+            </a:extLst>
+          </a:blip>
+          <a:stretch>
+            <a:fillRect/>
+          </a:stretch>
+        </p:blipFill>
+        <p:spPr>
+          <a:xfrm>
+            <a:off x="1447939" y="1417450"/>
+            <a:ext cx="329184" cy="329184"/>
+          </a:xfrm>
+          <a:prstGeom prst="rect">
+            <a:avLst/>
+          </a:prstGeom>
+        </p:spPr>
+      </p:pic>
+      <p:pic>
+        <p:nvPicPr>
+          <p:cNvPr id="5" name="Graphic 4" descr="Wireless router with solid fill">
+            <a:extLst>
+              <a:ext uri="{FF2B5EF4-FFF2-40B4-BE49-F238E27FC236}">
+                <a16:creationId xmlns:a16="http://schemas.microsoft.com/office/drawing/2014/main" id="{C0F0E0C4-41FA-7719-4E4D-2AF74CEB1972}"/>
+              </a:ext>
+            </a:extLst>
+          </p:cNvPr>
+          <p:cNvPicPr>
+            <a:picLocks noChangeAspect="1"/>
+          </p:cNvPicPr>
+          <p:nvPr/>
+        </p:nvPicPr>
+        <p:blipFill>
+          <a:blip r:embed="rId3">
+            <a:extLst>
+              <a:ext uri="{96DAC541-7B7A-43D3-8B79-37D633B846F1}">
+                <asvg:svgBlip xmlns:asvg="http://schemas.microsoft.com/office/drawing/2016/SVG/main" r:embed="rId4"/>
+              </a:ext>
+            </a:extLst>
+          </a:blip>
+          <a:stretch>
+            <a:fillRect/>
+          </a:stretch>
+        </p:blipFill>
+        <p:spPr>
+          <a:xfrm>
+            <a:off x="4271242" y="1399529"/>
+            <a:ext cx="329184" cy="329184"/>
+          </a:xfrm>
+          <a:prstGeom prst="rect">
+            <a:avLst/>
+          </a:prstGeom>
+        </p:spPr>
+      </p:pic>
+      <p:sp>
+        <p:nvSpPr>
+          <p:cNvPr id="6" name="Rectangle 5">
+            <a:extLst>
+              <a:ext uri="{FF2B5EF4-FFF2-40B4-BE49-F238E27FC236}">
+                <a16:creationId xmlns:a16="http://schemas.microsoft.com/office/drawing/2014/main" id="{BEB983EE-DEEC-15A8-1028-71F600B0993F}"/>
+              </a:ext>
+            </a:extLst>
+          </p:cNvPr>
+          <p:cNvSpPr/>
+          <p:nvPr/>
+        </p:nvSpPr>
+        <p:spPr>
+          <a:xfrm>
+            <a:off x="1063891" y="921178"/>
+            <a:ext cx="411479" cy="222033"/>
+          </a:xfrm>
+          <a:prstGeom prst="rect">
+            <a:avLst/>
+          </a:prstGeom>
+          <a:noFill/>
+        </p:spPr>
+        <p:style>
+          <a:lnRef idx="2">
+            <a:schemeClr val="accent1">
+              <a:shade val="15000"/>
+            </a:schemeClr>
+          </a:lnRef>
+          <a:fillRef idx="1">
+            <a:schemeClr val="accent1"/>
+          </a:fillRef>
+          <a:effectRef idx="0">
+            <a:schemeClr val="accent1"/>
+          </a:effectRef>
+          <a:fontRef idx="minor">
+            <a:schemeClr val="lt1"/>
+          </a:fontRef>
+        </p:style>
+        <p:txBody>
+          <a:bodyPr rtlCol="0" anchor="ctr"/>
+          <a:lstStyle/>
+          <a:p>
+            <a:pPr algn="ctr"/>
+            <a:endParaRPr lang="en-SG"/>
+          </a:p>
+        </p:txBody>
+      </p:sp>
+      <p:sp>
+        <p:nvSpPr>
+          <p:cNvPr id="7" name="Oval 6">
+            <a:extLst>
+              <a:ext uri="{FF2B5EF4-FFF2-40B4-BE49-F238E27FC236}">
+                <a16:creationId xmlns:a16="http://schemas.microsoft.com/office/drawing/2014/main" id="{3F919DFD-85A9-F620-1AD3-4E5894A79A07}"/>
+              </a:ext>
+            </a:extLst>
+          </p:cNvPr>
+          <p:cNvSpPr/>
+          <p:nvPr/>
+        </p:nvSpPr>
+        <p:spPr>
+          <a:xfrm>
+            <a:off x="1095894" y="955459"/>
+            <a:ext cx="164592" cy="153469"/>
+          </a:xfrm>
+          <a:prstGeom prst="ellipse">
+            <a:avLst/>
+          </a:prstGeom>
+          <a:solidFill>
+            <a:schemeClr val="accent6">
+              <a:lumMod val="75000"/>
+            </a:schemeClr>
+          </a:solidFill>
+        </p:spPr>
+        <p:style>
+          <a:lnRef idx="2">
+            <a:schemeClr val="accent1">
+              <a:shade val="15000"/>
+            </a:schemeClr>
+          </a:lnRef>
+          <a:fillRef idx="1">
+            <a:schemeClr val="accent1"/>
+          </a:fillRef>
+          <a:effectRef idx="0">
+            <a:schemeClr val="accent1"/>
+          </a:effectRef>
+          <a:fontRef idx="minor">
+            <a:schemeClr val="lt1"/>
+          </a:fontRef>
+        </p:style>
+        <p:txBody>
+          <a:bodyPr rtlCol="0" anchor="ctr"/>
+          <a:lstStyle/>
+          <a:p>
+            <a:pPr algn="ctr"/>
+            <a:endParaRPr lang="en-SG"/>
+          </a:p>
+        </p:txBody>
+      </p:sp>
+      <p:sp>
+        <p:nvSpPr>
+          <p:cNvPr id="8" name="Oval 7">
+            <a:extLst>
+              <a:ext uri="{FF2B5EF4-FFF2-40B4-BE49-F238E27FC236}">
+                <a16:creationId xmlns:a16="http://schemas.microsoft.com/office/drawing/2014/main" id="{A52E4E63-8E56-42FC-C187-88482AA6EFD1}"/>
+              </a:ext>
+            </a:extLst>
+          </p:cNvPr>
+          <p:cNvSpPr/>
+          <p:nvPr/>
+        </p:nvSpPr>
+        <p:spPr>
+          <a:xfrm>
+            <a:off x="1283347" y="955459"/>
+            <a:ext cx="164592" cy="153469"/>
+          </a:xfrm>
+          <a:prstGeom prst="ellipse">
+            <a:avLst/>
+          </a:prstGeom>
+          <a:noFill/>
+        </p:spPr>
+        <p:style>
+          <a:lnRef idx="2">
+            <a:schemeClr val="accent1">
+              <a:shade val="15000"/>
+            </a:schemeClr>
+          </a:lnRef>
+          <a:fillRef idx="1">
+            <a:schemeClr val="accent1"/>
+          </a:fillRef>
+          <a:effectRef idx="0">
+            <a:schemeClr val="accent1"/>
+          </a:effectRef>
+          <a:fontRef idx="minor">
+            <a:schemeClr val="lt1"/>
+          </a:fontRef>
+        </p:style>
+        <p:txBody>
+          <a:bodyPr rtlCol="0" anchor="ctr"/>
+          <a:lstStyle/>
+          <a:p>
+            <a:pPr algn="ctr"/>
+            <a:endParaRPr lang="en-SG"/>
+          </a:p>
+        </p:txBody>
+      </p:sp>
+      <p:cxnSp>
+        <p:nvCxnSpPr>
+          <p:cNvPr id="9" name="Straight Connector 8">
+            <a:extLst>
+              <a:ext uri="{FF2B5EF4-FFF2-40B4-BE49-F238E27FC236}">
+                <a16:creationId xmlns:a16="http://schemas.microsoft.com/office/drawing/2014/main" id="{5A029120-CE50-CE45-9C5C-053DF367102E}"/>
+              </a:ext>
+            </a:extLst>
+          </p:cNvPr>
+          <p:cNvCxnSpPr>
+            <a:cxnSpLocks/>
+            <a:stCxn id="6" idx="2"/>
+          </p:cNvCxnSpPr>
+          <p:nvPr/>
+        </p:nvCxnSpPr>
+        <p:spPr>
+          <a:xfrm flipH="1">
+            <a:off x="1269630" y="1143211"/>
+            <a:ext cx="1" cy="964594"/>
+          </a:xfrm>
+          <a:prstGeom prst="line">
+            <a:avLst/>
+          </a:prstGeom>
+        </p:spPr>
+        <p:style>
+          <a:lnRef idx="2">
+            <a:schemeClr val="accent1"/>
+          </a:lnRef>
+          <a:fillRef idx="0">
+            <a:schemeClr val="accent1"/>
+          </a:fillRef>
+          <a:effectRef idx="1">
+            <a:schemeClr val="accent1"/>
+          </a:effectRef>
+          <a:fontRef idx="minor">
+            <a:schemeClr val="tx1"/>
+          </a:fontRef>
+        </p:style>
+      </p:cxnSp>
+      <p:sp>
+        <p:nvSpPr>
+          <p:cNvPr id="10" name="Rectangle 9">
+            <a:extLst>
+              <a:ext uri="{FF2B5EF4-FFF2-40B4-BE49-F238E27FC236}">
+                <a16:creationId xmlns:a16="http://schemas.microsoft.com/office/drawing/2014/main" id="{28B28C78-AAA5-C2D7-64AC-6D402569B396}"/>
+              </a:ext>
+            </a:extLst>
+          </p:cNvPr>
+          <p:cNvSpPr/>
+          <p:nvPr/>
+        </p:nvSpPr>
+        <p:spPr>
+          <a:xfrm>
+            <a:off x="859540" y="1747072"/>
+            <a:ext cx="4349541" cy="84388"/>
+          </a:xfrm>
+          <a:prstGeom prst="rect">
+            <a:avLst/>
+          </a:prstGeom>
+        </p:spPr>
+        <p:style>
+          <a:lnRef idx="2">
+            <a:schemeClr val="accent1">
+              <a:shade val="15000"/>
+            </a:schemeClr>
+          </a:lnRef>
+          <a:fillRef idx="1">
+            <a:schemeClr val="accent1"/>
+          </a:fillRef>
+          <a:effectRef idx="0">
+            <a:schemeClr val="accent1"/>
+          </a:effectRef>
+          <a:fontRef idx="minor">
+            <a:schemeClr val="lt1"/>
+          </a:fontRef>
+        </p:style>
+        <p:txBody>
+          <a:bodyPr rtlCol="0" anchor="ctr"/>
+          <a:lstStyle/>
+          <a:p>
+            <a:pPr algn="ctr"/>
+            <a:endParaRPr lang="en-SG"/>
+          </a:p>
+        </p:txBody>
+      </p:sp>
+      <p:pic>
+        <p:nvPicPr>
+          <p:cNvPr id="11" name="Picture 10">
+            <a:extLst>
+              <a:ext uri="{FF2B5EF4-FFF2-40B4-BE49-F238E27FC236}">
+                <a16:creationId xmlns:a16="http://schemas.microsoft.com/office/drawing/2014/main" id="{18695765-4803-B063-7D1F-BB562AD6CBC6}"/>
+              </a:ext>
+            </a:extLst>
+          </p:cNvPr>
+          <p:cNvPicPr>
+            <a:picLocks noChangeAspect="1"/>
+          </p:cNvPicPr>
+          <p:nvPr/>
+        </p:nvPicPr>
+        <p:blipFill>
+          <a:blip r:embed="rId5"/>
+          <a:stretch>
+            <a:fillRect/>
+          </a:stretch>
+        </p:blipFill>
+        <p:spPr>
+          <a:xfrm>
+            <a:off x="2366598" y="3046892"/>
+            <a:ext cx="3200000" cy="1419048"/>
+          </a:xfrm>
+          <a:prstGeom prst="rect">
+            <a:avLst/>
+          </a:prstGeom>
+        </p:spPr>
+      </p:pic>
+      <p:pic>
+        <p:nvPicPr>
+          <p:cNvPr id="12" name="Picture 11">
+            <a:extLst>
+              <a:ext uri="{FF2B5EF4-FFF2-40B4-BE49-F238E27FC236}">
+                <a16:creationId xmlns:a16="http://schemas.microsoft.com/office/drawing/2014/main" id="{86B3B865-CD5A-9A28-F017-CAF89C9940E2}"/>
+              </a:ext>
+            </a:extLst>
+          </p:cNvPr>
+          <p:cNvPicPr>
+            <a:picLocks noChangeAspect="1"/>
+          </p:cNvPicPr>
+          <p:nvPr/>
+        </p:nvPicPr>
+        <p:blipFill>
+          <a:blip r:embed="rId6"/>
+          <a:stretch>
+            <a:fillRect/>
+          </a:stretch>
+        </p:blipFill>
+        <p:spPr>
+          <a:xfrm>
+            <a:off x="978012" y="3589133"/>
+            <a:ext cx="939854" cy="939854"/>
+          </a:xfrm>
+          <a:prstGeom prst="rect">
+            <a:avLst/>
+          </a:prstGeom>
+        </p:spPr>
+      </p:pic>
+      <p:sp>
+        <p:nvSpPr>
+          <p:cNvPr id="13" name="TextBox 12">
+            <a:extLst>
+              <a:ext uri="{FF2B5EF4-FFF2-40B4-BE49-F238E27FC236}">
+                <a16:creationId xmlns:a16="http://schemas.microsoft.com/office/drawing/2014/main" id="{E8F12B33-7A5A-3B6E-F111-D39922C10793}"/>
+              </a:ext>
+            </a:extLst>
+          </p:cNvPr>
+          <p:cNvSpPr txBox="1"/>
+          <p:nvPr/>
+        </p:nvSpPr>
+        <p:spPr>
+          <a:xfrm>
+            <a:off x="1428977" y="1208519"/>
+            <a:ext cx="1139639" cy="261610"/>
+          </a:xfrm>
+          <a:prstGeom prst="rect">
+            <a:avLst/>
+          </a:prstGeom>
+          <a:noFill/>
+        </p:spPr>
+        <p:txBody>
+          <a:bodyPr wrap="square">
+            <a:spAutoFit/>
+          </a:bodyPr>
+          <a:lstStyle/>
+          <a:p>
+            <a:r>
+              <a:rPr lang="en-US" sz="1100" b="1" dirty="0"/>
+              <a:t>Sensor(n)</a:t>
+            </a:r>
+            <a:endParaRPr lang="en-SG" sz="1100" b="1" dirty="0"/>
+          </a:p>
+        </p:txBody>
+      </p:sp>
+      <p:sp>
+        <p:nvSpPr>
+          <p:cNvPr id="14" name="TextBox 13">
+            <a:extLst>
+              <a:ext uri="{FF2B5EF4-FFF2-40B4-BE49-F238E27FC236}">
+                <a16:creationId xmlns:a16="http://schemas.microsoft.com/office/drawing/2014/main" id="{070992A0-640B-B9D2-7CE9-4F8858001F1E}"/>
+              </a:ext>
+            </a:extLst>
+          </p:cNvPr>
+          <p:cNvSpPr txBox="1"/>
+          <p:nvPr/>
+        </p:nvSpPr>
+        <p:spPr>
+          <a:xfrm>
+            <a:off x="4030606" y="1224945"/>
+            <a:ext cx="1139639" cy="261610"/>
+          </a:xfrm>
+          <a:prstGeom prst="rect">
+            <a:avLst/>
+          </a:prstGeom>
+          <a:noFill/>
+        </p:spPr>
+        <p:txBody>
+          <a:bodyPr wrap="square">
+            <a:spAutoFit/>
+          </a:bodyPr>
+          <a:lstStyle/>
+          <a:p>
+            <a:r>
+              <a:rPr lang="en-US" sz="1100" b="1" dirty="0"/>
+              <a:t>Sensor(n+1)</a:t>
+            </a:r>
+            <a:endParaRPr lang="en-SG" sz="1100" b="1" dirty="0"/>
+          </a:p>
+        </p:txBody>
+      </p:sp>
+      <p:sp>
+        <p:nvSpPr>
+          <p:cNvPr id="15" name="TextBox 14">
+            <a:extLst>
+              <a:ext uri="{FF2B5EF4-FFF2-40B4-BE49-F238E27FC236}">
+                <a16:creationId xmlns:a16="http://schemas.microsoft.com/office/drawing/2014/main" id="{93AB4DFB-AE79-1488-C785-8E1A1DAAFB16}"/>
+              </a:ext>
+            </a:extLst>
+          </p:cNvPr>
+          <p:cNvSpPr txBox="1"/>
+          <p:nvPr/>
+        </p:nvSpPr>
+        <p:spPr>
+          <a:xfrm>
+            <a:off x="905550" y="579671"/>
+            <a:ext cx="1139639" cy="261610"/>
+          </a:xfrm>
+          <a:prstGeom prst="rect">
+            <a:avLst/>
+          </a:prstGeom>
+          <a:noFill/>
+        </p:spPr>
+        <p:txBody>
+          <a:bodyPr wrap="square">
+            <a:spAutoFit/>
+          </a:bodyPr>
+          <a:lstStyle/>
+          <a:p>
+            <a:r>
+              <a:rPr lang="en-US" sz="1100" b="1" dirty="0"/>
+              <a:t>Signal(n)</a:t>
+            </a:r>
+            <a:endParaRPr lang="en-SG" sz="1100" b="1" dirty="0"/>
+          </a:p>
+        </p:txBody>
+      </p:sp>
+      <p:cxnSp>
+        <p:nvCxnSpPr>
+          <p:cNvPr id="16" name="Straight Connector 15">
+            <a:extLst>
+              <a:ext uri="{FF2B5EF4-FFF2-40B4-BE49-F238E27FC236}">
+                <a16:creationId xmlns:a16="http://schemas.microsoft.com/office/drawing/2014/main" id="{C43CA8D4-5D2C-835E-E9E3-7E31454BBD46}"/>
+              </a:ext>
+            </a:extLst>
+          </p:cNvPr>
+          <p:cNvCxnSpPr/>
+          <p:nvPr/>
+        </p:nvCxnSpPr>
+        <p:spPr>
+          <a:xfrm>
+            <a:off x="936903" y="2107805"/>
+            <a:ext cx="4194813" cy="0"/>
+          </a:xfrm>
+          <a:prstGeom prst="line">
+            <a:avLst/>
+          </a:prstGeom>
+        </p:spPr>
+        <p:style>
+          <a:lnRef idx="2">
+            <a:schemeClr val="accent1"/>
+          </a:lnRef>
+          <a:fillRef idx="0">
+            <a:schemeClr val="accent1"/>
+          </a:fillRef>
+          <a:effectRef idx="1">
+            <a:schemeClr val="accent1"/>
+          </a:effectRef>
+          <a:fontRef idx="minor">
+            <a:schemeClr val="tx1"/>
+          </a:fontRef>
+        </p:style>
+      </p:cxnSp>
+      <p:cxnSp>
+        <p:nvCxnSpPr>
+          <p:cNvPr id="17" name="Straight Connector 16">
+            <a:extLst>
+              <a:ext uri="{FF2B5EF4-FFF2-40B4-BE49-F238E27FC236}">
+                <a16:creationId xmlns:a16="http://schemas.microsoft.com/office/drawing/2014/main" id="{8E3E808E-800C-4DA5-88C3-9268A82E4CF0}"/>
+              </a:ext>
+            </a:extLst>
+          </p:cNvPr>
+          <p:cNvCxnSpPr>
+            <a:cxnSpLocks/>
+          </p:cNvCxnSpPr>
+          <p:nvPr/>
+        </p:nvCxnSpPr>
+        <p:spPr>
+          <a:xfrm>
+            <a:off x="859540" y="2296781"/>
+            <a:ext cx="4272175" cy="0"/>
+          </a:xfrm>
+          <a:prstGeom prst="line">
+            <a:avLst/>
+          </a:prstGeom>
+          <a:ln>
+            <a:solidFill>
+              <a:schemeClr val="accent5">
+                <a:lumMod val="75000"/>
+              </a:schemeClr>
+            </a:solidFill>
+          </a:ln>
+        </p:spPr>
+        <p:style>
+          <a:lnRef idx="2">
+            <a:schemeClr val="accent1"/>
+          </a:lnRef>
+          <a:fillRef idx="0">
+            <a:schemeClr val="accent1"/>
+          </a:fillRef>
+          <a:effectRef idx="1">
+            <a:schemeClr val="accent1"/>
+          </a:effectRef>
+          <a:fontRef idx="minor">
+            <a:schemeClr val="tx1"/>
+          </a:fontRef>
+        </p:style>
+      </p:cxnSp>
+      <p:cxnSp>
+        <p:nvCxnSpPr>
+          <p:cNvPr id="18" name="Straight Connector 17">
+            <a:extLst>
+              <a:ext uri="{FF2B5EF4-FFF2-40B4-BE49-F238E27FC236}">
+                <a16:creationId xmlns:a16="http://schemas.microsoft.com/office/drawing/2014/main" id="{38D6C8E9-B8EF-D01B-60BE-3D5ABF8E1375}"/>
+              </a:ext>
+            </a:extLst>
+          </p:cNvPr>
+          <p:cNvCxnSpPr>
+            <a:cxnSpLocks/>
+          </p:cNvCxnSpPr>
+          <p:nvPr/>
+        </p:nvCxnSpPr>
+        <p:spPr>
+          <a:xfrm>
+            <a:off x="859540" y="2497949"/>
+            <a:ext cx="4272175" cy="0"/>
+          </a:xfrm>
+          <a:prstGeom prst="line">
+            <a:avLst/>
+          </a:prstGeom>
+          <a:ln>
+            <a:solidFill>
+              <a:schemeClr val="accent2">
+                <a:lumMod val="75000"/>
+              </a:schemeClr>
+            </a:solidFill>
+          </a:ln>
+        </p:spPr>
+        <p:style>
+          <a:lnRef idx="2">
+            <a:schemeClr val="accent1"/>
+          </a:lnRef>
+          <a:fillRef idx="0">
+            <a:schemeClr val="accent1"/>
+          </a:fillRef>
+          <a:effectRef idx="1">
+            <a:schemeClr val="accent1"/>
+          </a:effectRef>
+          <a:fontRef idx="minor">
+            <a:schemeClr val="tx1"/>
+          </a:fontRef>
+        </p:style>
+      </p:cxnSp>
+      <p:cxnSp>
+        <p:nvCxnSpPr>
+          <p:cNvPr id="19" name="Straight Connector 18">
+            <a:extLst>
+              <a:ext uri="{FF2B5EF4-FFF2-40B4-BE49-F238E27FC236}">
+                <a16:creationId xmlns:a16="http://schemas.microsoft.com/office/drawing/2014/main" id="{922CC1D7-BF7B-9E46-970A-68E6B0528E69}"/>
+              </a:ext>
+            </a:extLst>
+          </p:cNvPr>
+          <p:cNvCxnSpPr>
+            <a:cxnSpLocks/>
+          </p:cNvCxnSpPr>
+          <p:nvPr/>
+        </p:nvCxnSpPr>
+        <p:spPr>
+          <a:xfrm>
+            <a:off x="1612531" y="1705484"/>
+            <a:ext cx="0" cy="575359"/>
+          </a:xfrm>
+          <a:prstGeom prst="line">
+            <a:avLst/>
+          </a:prstGeom>
+          <a:ln>
+            <a:solidFill>
+              <a:schemeClr val="accent5">
+                <a:lumMod val="75000"/>
+              </a:schemeClr>
+            </a:solidFill>
+          </a:ln>
+        </p:spPr>
+        <p:style>
+          <a:lnRef idx="2">
+            <a:schemeClr val="accent1"/>
+          </a:lnRef>
+          <a:fillRef idx="0">
+            <a:schemeClr val="accent1"/>
+          </a:fillRef>
+          <a:effectRef idx="1">
+            <a:schemeClr val="accent1"/>
+          </a:effectRef>
+          <a:fontRef idx="minor">
+            <a:schemeClr val="tx1"/>
+          </a:fontRef>
+        </p:style>
+      </p:cxnSp>
+      <p:cxnSp>
+        <p:nvCxnSpPr>
+          <p:cNvPr id="20" name="Straight Connector 19">
+            <a:extLst>
+              <a:ext uri="{FF2B5EF4-FFF2-40B4-BE49-F238E27FC236}">
+                <a16:creationId xmlns:a16="http://schemas.microsoft.com/office/drawing/2014/main" id="{863D3ADD-9354-0C04-0110-D3DB79ECA8E6}"/>
+              </a:ext>
+            </a:extLst>
+          </p:cNvPr>
+          <p:cNvCxnSpPr>
+            <a:cxnSpLocks/>
+          </p:cNvCxnSpPr>
+          <p:nvPr/>
+        </p:nvCxnSpPr>
+        <p:spPr>
+          <a:xfrm>
+            <a:off x="4435834" y="1831460"/>
+            <a:ext cx="0" cy="666489"/>
+          </a:xfrm>
+          <a:prstGeom prst="line">
+            <a:avLst/>
+          </a:prstGeom>
+          <a:ln>
+            <a:solidFill>
+              <a:schemeClr val="accent2">
+                <a:lumMod val="75000"/>
+              </a:schemeClr>
+            </a:solidFill>
+          </a:ln>
+        </p:spPr>
+        <p:style>
+          <a:lnRef idx="2">
+            <a:schemeClr val="accent1"/>
+          </a:lnRef>
+          <a:fillRef idx="0">
+            <a:schemeClr val="accent1"/>
+          </a:fillRef>
+          <a:effectRef idx="1">
+            <a:schemeClr val="accent1"/>
+          </a:effectRef>
+          <a:fontRef idx="minor">
+            <a:schemeClr val="tx1"/>
+          </a:fontRef>
+        </p:style>
+      </p:cxnSp>
+      <p:cxnSp>
+        <p:nvCxnSpPr>
+          <p:cNvPr id="21" name="Straight Connector 20">
+            <a:extLst>
+              <a:ext uri="{FF2B5EF4-FFF2-40B4-BE49-F238E27FC236}">
+                <a16:creationId xmlns:a16="http://schemas.microsoft.com/office/drawing/2014/main" id="{71BEB5B8-1408-6475-0B28-7A18580C9B7B}"/>
+              </a:ext>
+            </a:extLst>
+          </p:cNvPr>
+          <p:cNvCxnSpPr>
+            <a:cxnSpLocks/>
+          </p:cNvCxnSpPr>
+          <p:nvPr/>
+        </p:nvCxnSpPr>
+        <p:spPr>
+          <a:xfrm>
+            <a:off x="5108146" y="2090416"/>
+            <a:ext cx="0" cy="1309741"/>
+          </a:xfrm>
+          <a:prstGeom prst="line">
+            <a:avLst/>
+          </a:prstGeom>
+        </p:spPr>
+        <p:style>
+          <a:lnRef idx="2">
+            <a:schemeClr val="accent1"/>
+          </a:lnRef>
+          <a:fillRef idx="0">
+            <a:schemeClr val="accent1"/>
+          </a:fillRef>
+          <a:effectRef idx="1">
+            <a:schemeClr val="accent1"/>
+          </a:effectRef>
+          <a:fontRef idx="minor">
+            <a:schemeClr val="tx1"/>
+          </a:fontRef>
+        </p:style>
+      </p:cxnSp>
+      <p:cxnSp>
+        <p:nvCxnSpPr>
+          <p:cNvPr id="22" name="Straight Connector 21">
+            <a:extLst>
+              <a:ext uri="{FF2B5EF4-FFF2-40B4-BE49-F238E27FC236}">
+                <a16:creationId xmlns:a16="http://schemas.microsoft.com/office/drawing/2014/main" id="{3080FB3E-8A8F-E074-A05F-7B2969543C88}"/>
+              </a:ext>
+            </a:extLst>
+          </p:cNvPr>
+          <p:cNvCxnSpPr>
+            <a:cxnSpLocks/>
+          </p:cNvCxnSpPr>
+          <p:nvPr/>
+        </p:nvCxnSpPr>
+        <p:spPr>
+          <a:xfrm>
+            <a:off x="2184640" y="2497949"/>
+            <a:ext cx="0" cy="1818995"/>
+          </a:xfrm>
+          <a:prstGeom prst="line">
+            <a:avLst/>
+          </a:prstGeom>
+          <a:ln>
+            <a:solidFill>
+              <a:schemeClr val="accent2">
+                <a:lumMod val="75000"/>
+              </a:schemeClr>
+            </a:solidFill>
+          </a:ln>
+        </p:spPr>
+        <p:style>
+          <a:lnRef idx="2">
+            <a:schemeClr val="accent1"/>
+          </a:lnRef>
+          <a:fillRef idx="0">
+            <a:schemeClr val="accent1"/>
+          </a:fillRef>
+          <a:effectRef idx="1">
+            <a:schemeClr val="accent1"/>
+          </a:effectRef>
+          <a:fontRef idx="minor">
+            <a:schemeClr val="tx1"/>
+          </a:fontRef>
+        </p:style>
+      </p:cxnSp>
+      <p:cxnSp>
+        <p:nvCxnSpPr>
+          <p:cNvPr id="23" name="Straight Connector 22">
+            <a:extLst>
+              <a:ext uri="{FF2B5EF4-FFF2-40B4-BE49-F238E27FC236}">
+                <a16:creationId xmlns:a16="http://schemas.microsoft.com/office/drawing/2014/main" id="{E0D909CC-25CC-D757-403D-DA55CF1DAC20}"/>
+              </a:ext>
+            </a:extLst>
+          </p:cNvPr>
+          <p:cNvCxnSpPr>
+            <a:cxnSpLocks/>
+          </p:cNvCxnSpPr>
+          <p:nvPr/>
+        </p:nvCxnSpPr>
+        <p:spPr>
+          <a:xfrm>
+            <a:off x="2184640" y="4316944"/>
+            <a:ext cx="519008" cy="0"/>
+          </a:xfrm>
+          <a:prstGeom prst="line">
+            <a:avLst/>
+          </a:prstGeom>
+          <a:ln>
+            <a:solidFill>
+              <a:schemeClr val="accent2">
+                <a:lumMod val="75000"/>
+              </a:schemeClr>
+            </a:solidFill>
+          </a:ln>
+        </p:spPr>
+        <p:style>
+          <a:lnRef idx="2">
+            <a:schemeClr val="accent1"/>
+          </a:lnRef>
+          <a:fillRef idx="0">
+            <a:schemeClr val="accent1"/>
+          </a:fillRef>
+          <a:effectRef idx="1">
+            <a:schemeClr val="accent1"/>
+          </a:effectRef>
+          <a:fontRef idx="minor">
+            <a:schemeClr val="tx1"/>
+          </a:fontRef>
+        </p:style>
+      </p:cxnSp>
+      <p:cxnSp>
+        <p:nvCxnSpPr>
+          <p:cNvPr id="24" name="Straight Connector 23">
+            <a:extLst>
+              <a:ext uri="{FF2B5EF4-FFF2-40B4-BE49-F238E27FC236}">
+                <a16:creationId xmlns:a16="http://schemas.microsoft.com/office/drawing/2014/main" id="{AA6D9B3C-6B9B-2E0B-5D17-F288EC48D4B4}"/>
+              </a:ext>
+            </a:extLst>
+          </p:cNvPr>
+          <p:cNvCxnSpPr>
+            <a:cxnSpLocks/>
+          </p:cNvCxnSpPr>
+          <p:nvPr/>
+        </p:nvCxnSpPr>
+        <p:spPr>
+          <a:xfrm>
+            <a:off x="2743339" y="2296781"/>
+            <a:ext cx="0" cy="999744"/>
+          </a:xfrm>
+          <a:prstGeom prst="line">
+            <a:avLst/>
+          </a:prstGeom>
+          <a:ln>
+            <a:solidFill>
+              <a:schemeClr val="accent5">
+                <a:lumMod val="75000"/>
+              </a:schemeClr>
+            </a:solidFill>
+          </a:ln>
+        </p:spPr>
+        <p:style>
+          <a:lnRef idx="2">
+            <a:schemeClr val="accent1"/>
+          </a:lnRef>
+          <a:fillRef idx="0">
+            <a:schemeClr val="accent1"/>
+          </a:fillRef>
+          <a:effectRef idx="1">
+            <a:schemeClr val="accent1"/>
+          </a:effectRef>
+          <a:fontRef idx="minor">
+            <a:schemeClr val="tx1"/>
+          </a:fontRef>
+        </p:style>
+      </p:cxnSp>
+      <p:cxnSp>
+        <p:nvCxnSpPr>
+          <p:cNvPr id="25" name="Straight Connector 24">
+            <a:extLst>
+              <a:ext uri="{FF2B5EF4-FFF2-40B4-BE49-F238E27FC236}">
+                <a16:creationId xmlns:a16="http://schemas.microsoft.com/office/drawing/2014/main" id="{4A605D0A-C0AB-0E51-0B4F-8A650BB1FD4E}"/>
+              </a:ext>
+            </a:extLst>
+          </p:cNvPr>
+          <p:cNvCxnSpPr/>
+          <p:nvPr/>
+        </p:nvCxnSpPr>
+        <p:spPr>
+          <a:xfrm flipH="1">
+            <a:off x="1834402" y="3829568"/>
+            <a:ext cx="937647" cy="0"/>
+          </a:xfrm>
+          <a:prstGeom prst="line">
+            <a:avLst/>
+          </a:prstGeom>
+          <a:ln>
+            <a:solidFill>
+              <a:schemeClr val="tx1"/>
+            </a:solidFill>
+          </a:ln>
+        </p:spPr>
+        <p:style>
+          <a:lnRef idx="2">
+            <a:schemeClr val="accent1"/>
+          </a:lnRef>
+          <a:fillRef idx="0">
+            <a:schemeClr val="accent1"/>
+          </a:fillRef>
+          <a:effectRef idx="1">
+            <a:schemeClr val="accent1"/>
+          </a:effectRef>
+          <a:fontRef idx="minor">
+            <a:schemeClr val="tx1"/>
+          </a:fontRef>
+        </p:style>
+      </p:cxnSp>
+      <p:pic>
+        <p:nvPicPr>
+          <p:cNvPr id="26" name="Picture 25">
+            <a:extLst>
+              <a:ext uri="{FF2B5EF4-FFF2-40B4-BE49-F238E27FC236}">
+                <a16:creationId xmlns:a16="http://schemas.microsoft.com/office/drawing/2014/main" id="{E617DE16-D55E-ADA5-EF83-51C3D5034556}"/>
+              </a:ext>
+            </a:extLst>
+          </p:cNvPr>
+          <p:cNvPicPr>
+            <a:picLocks noChangeAspect="1"/>
+          </p:cNvPicPr>
+          <p:nvPr/>
+        </p:nvPicPr>
+        <p:blipFill>
+          <a:blip r:embed="rId7">
+            <a:extLst>
+              <a:ext uri="{28A0092B-C50C-407E-A947-70E740481C1C}">
+                <a14:useLocalDpi xmlns:a14="http://schemas.microsoft.com/office/drawing/2010/main" val="0"/>
+              </a:ext>
+            </a:extLst>
+          </a:blip>
+          <a:stretch>
+            <a:fillRect/>
+          </a:stretch>
+        </p:blipFill>
+        <p:spPr>
+          <a:xfrm rot="5400000">
+            <a:off x="767676" y="2827241"/>
+            <a:ext cx="476190" cy="409524"/>
+          </a:xfrm>
+          <a:prstGeom prst="rect">
+            <a:avLst/>
+          </a:prstGeom>
+        </p:spPr>
+      </p:pic>
+      <p:cxnSp>
+        <p:nvCxnSpPr>
+          <p:cNvPr id="27" name="Straight Connector 26">
+            <a:extLst>
+              <a:ext uri="{FF2B5EF4-FFF2-40B4-BE49-F238E27FC236}">
+                <a16:creationId xmlns:a16="http://schemas.microsoft.com/office/drawing/2014/main" id="{6DCC1D5D-472E-F9AF-77AD-D2446574341A}"/>
+              </a:ext>
+            </a:extLst>
+          </p:cNvPr>
+          <p:cNvCxnSpPr>
+            <a:cxnSpLocks/>
+            <a:endCxn id="26" idx="3"/>
+          </p:cNvCxnSpPr>
+          <p:nvPr/>
+        </p:nvCxnSpPr>
+        <p:spPr>
+          <a:xfrm flipH="1" flipV="1">
+            <a:off x="1005771" y="3270098"/>
+            <a:ext cx="7880" cy="556725"/>
+          </a:xfrm>
+          <a:prstGeom prst="line">
+            <a:avLst/>
+          </a:prstGeom>
+          <a:ln>
+            <a:solidFill>
+              <a:schemeClr val="tx1"/>
+            </a:solidFill>
+          </a:ln>
+        </p:spPr>
+        <p:style>
+          <a:lnRef idx="2">
+            <a:schemeClr val="accent1"/>
+          </a:lnRef>
+          <a:fillRef idx="0">
+            <a:schemeClr val="accent1"/>
+          </a:fillRef>
+          <a:effectRef idx="1">
+            <a:schemeClr val="accent1"/>
+          </a:effectRef>
+          <a:fontRef idx="minor">
+            <a:schemeClr val="tx1"/>
+          </a:fontRef>
+        </p:style>
+      </p:cxnSp>
+      <p:cxnSp>
+        <p:nvCxnSpPr>
+          <p:cNvPr id="28" name="Straight Connector 27">
+            <a:extLst>
+              <a:ext uri="{FF2B5EF4-FFF2-40B4-BE49-F238E27FC236}">
+                <a16:creationId xmlns:a16="http://schemas.microsoft.com/office/drawing/2014/main" id="{2EBCC380-5933-033C-192D-DCB7B2286E30}"/>
+              </a:ext>
+            </a:extLst>
+          </p:cNvPr>
+          <p:cNvCxnSpPr>
+            <a:cxnSpLocks/>
+          </p:cNvCxnSpPr>
+          <p:nvPr/>
+        </p:nvCxnSpPr>
+        <p:spPr>
+          <a:xfrm>
+            <a:off x="936097" y="2296781"/>
+            <a:ext cx="0" cy="575359"/>
+          </a:xfrm>
+          <a:prstGeom prst="line">
+            <a:avLst/>
+          </a:prstGeom>
+          <a:ln>
+            <a:solidFill>
+              <a:schemeClr val="accent5">
+                <a:lumMod val="75000"/>
+              </a:schemeClr>
+            </a:solidFill>
+          </a:ln>
+        </p:spPr>
+        <p:style>
+          <a:lnRef idx="2">
+            <a:schemeClr val="accent1"/>
+          </a:lnRef>
+          <a:fillRef idx="0">
+            <a:schemeClr val="accent1"/>
+          </a:fillRef>
+          <a:effectRef idx="1">
+            <a:schemeClr val="accent1"/>
+          </a:effectRef>
+          <a:fontRef idx="minor">
+            <a:schemeClr val="tx1"/>
+          </a:fontRef>
+        </p:style>
+      </p:cxnSp>
+      <p:cxnSp>
+        <p:nvCxnSpPr>
+          <p:cNvPr id="29" name="Straight Connector 28">
+            <a:extLst>
+              <a:ext uri="{FF2B5EF4-FFF2-40B4-BE49-F238E27FC236}">
+                <a16:creationId xmlns:a16="http://schemas.microsoft.com/office/drawing/2014/main" id="{2B59E6B8-95A8-4FB2-A4F9-1276754C802D}"/>
+              </a:ext>
+            </a:extLst>
+          </p:cNvPr>
+          <p:cNvCxnSpPr>
+            <a:cxnSpLocks/>
+          </p:cNvCxnSpPr>
+          <p:nvPr/>
+        </p:nvCxnSpPr>
+        <p:spPr>
+          <a:xfrm>
+            <a:off x="1087672" y="2497949"/>
+            <a:ext cx="0" cy="350520"/>
+          </a:xfrm>
+          <a:prstGeom prst="line">
+            <a:avLst/>
+          </a:prstGeom>
+          <a:ln>
+            <a:solidFill>
+              <a:schemeClr val="accent2">
+                <a:lumMod val="75000"/>
+              </a:schemeClr>
+            </a:solidFill>
+          </a:ln>
+        </p:spPr>
+        <p:style>
+          <a:lnRef idx="2">
+            <a:schemeClr val="accent1"/>
+          </a:lnRef>
+          <a:fillRef idx="0">
+            <a:schemeClr val="accent1"/>
+          </a:fillRef>
+          <a:effectRef idx="1">
+            <a:schemeClr val="accent1"/>
+          </a:effectRef>
+          <a:fontRef idx="minor">
+            <a:schemeClr val="tx1"/>
+          </a:fontRef>
+        </p:style>
+      </p:cxnSp>
+      <p:sp>
+        <p:nvSpPr>
+          <p:cNvPr id="30" name="Oval 29">
+            <a:extLst>
+              <a:ext uri="{FF2B5EF4-FFF2-40B4-BE49-F238E27FC236}">
+                <a16:creationId xmlns:a16="http://schemas.microsoft.com/office/drawing/2014/main" id="{378DCE6A-789D-F7C9-2835-D91998C8F30E}"/>
+              </a:ext>
+            </a:extLst>
+          </p:cNvPr>
+          <p:cNvSpPr/>
+          <p:nvPr/>
+        </p:nvSpPr>
+        <p:spPr>
+          <a:xfrm>
+            <a:off x="911815" y="2268352"/>
+            <a:ext cx="62346" cy="86009"/>
+          </a:xfrm>
+          <a:prstGeom prst="ellipse">
+            <a:avLst/>
+          </a:prstGeom>
+        </p:spPr>
+        <p:style>
+          <a:lnRef idx="2">
+            <a:schemeClr val="accent1">
+              <a:shade val="15000"/>
+            </a:schemeClr>
+          </a:lnRef>
+          <a:fillRef idx="1">
+            <a:schemeClr val="accent1"/>
+          </a:fillRef>
+          <a:effectRef idx="0">
+            <a:schemeClr val="accent1"/>
+          </a:effectRef>
+          <a:fontRef idx="minor">
+            <a:schemeClr val="lt1"/>
+          </a:fontRef>
+        </p:style>
+        <p:txBody>
+          <a:bodyPr rtlCol="0" anchor="ctr"/>
+          <a:lstStyle/>
+          <a:p>
+            <a:pPr algn="ctr"/>
+            <a:endParaRPr lang="en-SG"/>
+          </a:p>
+        </p:txBody>
+      </p:sp>
+      <p:sp>
+        <p:nvSpPr>
+          <p:cNvPr id="31" name="Oval 30">
+            <a:extLst>
+              <a:ext uri="{FF2B5EF4-FFF2-40B4-BE49-F238E27FC236}">
+                <a16:creationId xmlns:a16="http://schemas.microsoft.com/office/drawing/2014/main" id="{C085DEAB-4767-8C41-A210-B78ADC393F6D}"/>
+              </a:ext>
+            </a:extLst>
+          </p:cNvPr>
+          <p:cNvSpPr/>
+          <p:nvPr/>
+        </p:nvSpPr>
+        <p:spPr>
+          <a:xfrm>
+            <a:off x="1230669" y="2047411"/>
+            <a:ext cx="62346" cy="86009"/>
+          </a:xfrm>
+          <a:prstGeom prst="ellipse">
+            <a:avLst/>
+          </a:prstGeom>
+        </p:spPr>
+        <p:style>
+          <a:lnRef idx="2">
+            <a:schemeClr val="accent1">
+              <a:shade val="15000"/>
+            </a:schemeClr>
+          </a:lnRef>
+          <a:fillRef idx="1">
+            <a:schemeClr val="accent1"/>
+          </a:fillRef>
+          <a:effectRef idx="0">
+            <a:schemeClr val="accent1"/>
+          </a:effectRef>
+          <a:fontRef idx="minor">
+            <a:schemeClr val="lt1"/>
+          </a:fontRef>
+        </p:style>
+        <p:txBody>
+          <a:bodyPr rtlCol="0" anchor="ctr"/>
+          <a:lstStyle/>
+          <a:p>
+            <a:pPr algn="ctr"/>
+            <a:endParaRPr lang="en-SG"/>
+          </a:p>
+        </p:txBody>
+      </p:sp>
+      <p:sp>
+        <p:nvSpPr>
+          <p:cNvPr id="32" name="Oval 31">
+            <a:extLst>
+              <a:ext uri="{FF2B5EF4-FFF2-40B4-BE49-F238E27FC236}">
+                <a16:creationId xmlns:a16="http://schemas.microsoft.com/office/drawing/2014/main" id="{26AD8E13-3914-A8B7-249F-BFF948979ED0}"/>
+              </a:ext>
+            </a:extLst>
+          </p:cNvPr>
+          <p:cNvSpPr/>
+          <p:nvPr/>
+        </p:nvSpPr>
+        <p:spPr>
+          <a:xfrm>
+            <a:off x="1584645" y="2259805"/>
+            <a:ext cx="62346" cy="86009"/>
+          </a:xfrm>
+          <a:prstGeom prst="ellipse">
+            <a:avLst/>
+          </a:prstGeom>
+        </p:spPr>
+        <p:style>
+          <a:lnRef idx="2">
+            <a:schemeClr val="accent1">
+              <a:shade val="15000"/>
+            </a:schemeClr>
+          </a:lnRef>
+          <a:fillRef idx="1">
+            <a:schemeClr val="accent1"/>
+          </a:fillRef>
+          <a:effectRef idx="0">
+            <a:schemeClr val="accent1"/>
+          </a:effectRef>
+          <a:fontRef idx="minor">
+            <a:schemeClr val="lt1"/>
+          </a:fontRef>
+        </p:style>
+        <p:txBody>
+          <a:bodyPr rtlCol="0" anchor="ctr"/>
+          <a:lstStyle/>
+          <a:p>
+            <a:pPr algn="ctr"/>
+            <a:endParaRPr lang="en-SG"/>
+          </a:p>
+        </p:txBody>
+      </p:sp>
+      <p:sp>
+        <p:nvSpPr>
+          <p:cNvPr id="33" name="Oval 32">
+            <a:extLst>
+              <a:ext uri="{FF2B5EF4-FFF2-40B4-BE49-F238E27FC236}">
+                <a16:creationId xmlns:a16="http://schemas.microsoft.com/office/drawing/2014/main" id="{9E00281F-3D3B-26DF-2E20-390CB1722BC1}"/>
+              </a:ext>
+            </a:extLst>
+          </p:cNvPr>
+          <p:cNvSpPr/>
+          <p:nvPr/>
+        </p:nvSpPr>
+        <p:spPr>
+          <a:xfrm>
+            <a:off x="1056499" y="2462653"/>
+            <a:ext cx="62346" cy="86009"/>
+          </a:xfrm>
+          <a:prstGeom prst="ellipse">
+            <a:avLst/>
+          </a:prstGeom>
+        </p:spPr>
+        <p:style>
+          <a:lnRef idx="2">
+            <a:schemeClr val="accent1">
+              <a:shade val="15000"/>
+            </a:schemeClr>
+          </a:lnRef>
+          <a:fillRef idx="1">
+            <a:schemeClr val="accent1"/>
+          </a:fillRef>
+          <a:effectRef idx="0">
+            <a:schemeClr val="accent1"/>
+          </a:effectRef>
+          <a:fontRef idx="minor">
+            <a:schemeClr val="lt1"/>
+          </a:fontRef>
+        </p:style>
+        <p:txBody>
+          <a:bodyPr rtlCol="0" anchor="ctr"/>
+          <a:lstStyle/>
+          <a:p>
+            <a:pPr algn="ctr"/>
+            <a:endParaRPr lang="en-SG"/>
+          </a:p>
+        </p:txBody>
+      </p:sp>
+      <p:sp>
+        <p:nvSpPr>
+          <p:cNvPr id="34" name="Oval 33">
+            <a:extLst>
+              <a:ext uri="{FF2B5EF4-FFF2-40B4-BE49-F238E27FC236}">
+                <a16:creationId xmlns:a16="http://schemas.microsoft.com/office/drawing/2014/main" id="{8C0D3B98-0BB8-28E6-8FFE-3C38A665074C}"/>
+              </a:ext>
+            </a:extLst>
+          </p:cNvPr>
+          <p:cNvSpPr/>
+          <p:nvPr/>
+        </p:nvSpPr>
+        <p:spPr>
+          <a:xfrm>
+            <a:off x="2152847" y="2471842"/>
+            <a:ext cx="62346" cy="86009"/>
+          </a:xfrm>
+          <a:prstGeom prst="ellipse">
+            <a:avLst/>
+          </a:prstGeom>
+        </p:spPr>
+        <p:style>
+          <a:lnRef idx="2">
+            <a:schemeClr val="accent1">
+              <a:shade val="15000"/>
+            </a:schemeClr>
+          </a:lnRef>
+          <a:fillRef idx="1">
+            <a:schemeClr val="accent1"/>
+          </a:fillRef>
+          <a:effectRef idx="0">
+            <a:schemeClr val="accent1"/>
+          </a:effectRef>
+          <a:fontRef idx="minor">
+            <a:schemeClr val="lt1"/>
+          </a:fontRef>
+        </p:style>
+        <p:txBody>
+          <a:bodyPr rtlCol="0" anchor="ctr"/>
+          <a:lstStyle/>
+          <a:p>
+            <a:pPr algn="ctr"/>
+            <a:endParaRPr lang="en-SG"/>
+          </a:p>
+        </p:txBody>
+      </p:sp>
+      <p:sp>
+        <p:nvSpPr>
+          <p:cNvPr id="35" name="Oval 34">
+            <a:extLst>
+              <a:ext uri="{FF2B5EF4-FFF2-40B4-BE49-F238E27FC236}">
+                <a16:creationId xmlns:a16="http://schemas.microsoft.com/office/drawing/2014/main" id="{1921E01C-3E4B-BEFB-88B9-4B41E896E93B}"/>
+              </a:ext>
+            </a:extLst>
+          </p:cNvPr>
+          <p:cNvSpPr/>
+          <p:nvPr/>
+        </p:nvSpPr>
+        <p:spPr>
+          <a:xfrm>
+            <a:off x="2710089" y="2271183"/>
+            <a:ext cx="62346" cy="86009"/>
+          </a:xfrm>
+          <a:prstGeom prst="ellipse">
+            <a:avLst/>
+          </a:prstGeom>
+        </p:spPr>
+        <p:style>
+          <a:lnRef idx="2">
+            <a:schemeClr val="accent1">
+              <a:shade val="15000"/>
+            </a:schemeClr>
+          </a:lnRef>
+          <a:fillRef idx="1">
+            <a:schemeClr val="accent1"/>
+          </a:fillRef>
+          <a:effectRef idx="0">
+            <a:schemeClr val="accent1"/>
+          </a:effectRef>
+          <a:fontRef idx="minor">
+            <a:schemeClr val="lt1"/>
+          </a:fontRef>
+        </p:style>
+        <p:txBody>
+          <a:bodyPr rtlCol="0" anchor="ctr"/>
+          <a:lstStyle/>
+          <a:p>
+            <a:pPr algn="ctr"/>
+            <a:endParaRPr lang="en-SG"/>
+          </a:p>
+        </p:txBody>
+      </p:sp>
+      <p:sp>
+        <p:nvSpPr>
+          <p:cNvPr id="36" name="Oval 35">
+            <a:extLst>
+              <a:ext uri="{FF2B5EF4-FFF2-40B4-BE49-F238E27FC236}">
+                <a16:creationId xmlns:a16="http://schemas.microsoft.com/office/drawing/2014/main" id="{1A317BD7-1CAF-B7AC-E2D1-89EAEB0F30F3}"/>
+              </a:ext>
+            </a:extLst>
+          </p:cNvPr>
+          <p:cNvSpPr/>
+          <p:nvPr/>
+        </p:nvSpPr>
+        <p:spPr>
+          <a:xfrm>
+            <a:off x="4404661" y="2451871"/>
+            <a:ext cx="62346" cy="86009"/>
+          </a:xfrm>
+          <a:prstGeom prst="ellipse">
+            <a:avLst/>
+          </a:prstGeom>
+        </p:spPr>
+        <p:style>
+          <a:lnRef idx="2">
+            <a:schemeClr val="accent1">
+              <a:shade val="15000"/>
+            </a:schemeClr>
+          </a:lnRef>
+          <a:fillRef idx="1">
+            <a:schemeClr val="accent1"/>
+          </a:fillRef>
+          <a:effectRef idx="0">
+            <a:schemeClr val="accent1"/>
+          </a:effectRef>
+          <a:fontRef idx="minor">
+            <a:schemeClr val="lt1"/>
+          </a:fontRef>
+        </p:style>
+        <p:txBody>
+          <a:bodyPr rtlCol="0" anchor="ctr"/>
+          <a:lstStyle/>
+          <a:p>
+            <a:pPr algn="ctr"/>
+            <a:endParaRPr lang="en-SG"/>
+          </a:p>
+        </p:txBody>
+      </p:sp>
+      <p:sp>
+        <p:nvSpPr>
+          <p:cNvPr id="37" name="Oval 36">
+            <a:extLst>
+              <a:ext uri="{FF2B5EF4-FFF2-40B4-BE49-F238E27FC236}">
+                <a16:creationId xmlns:a16="http://schemas.microsoft.com/office/drawing/2014/main" id="{F7C141F6-7611-7CBE-2DE7-63B1E9863808}"/>
+              </a:ext>
+            </a:extLst>
+          </p:cNvPr>
+          <p:cNvSpPr/>
+          <p:nvPr/>
+        </p:nvSpPr>
+        <p:spPr>
+          <a:xfrm>
+            <a:off x="5069369" y="2075270"/>
+            <a:ext cx="62346" cy="86009"/>
+          </a:xfrm>
+          <a:prstGeom prst="ellipse">
+            <a:avLst/>
+          </a:prstGeom>
+        </p:spPr>
+        <p:style>
+          <a:lnRef idx="2">
+            <a:schemeClr val="accent1">
+              <a:shade val="15000"/>
+            </a:schemeClr>
+          </a:lnRef>
+          <a:fillRef idx="1">
+            <a:schemeClr val="accent1"/>
+          </a:fillRef>
+          <a:effectRef idx="0">
+            <a:schemeClr val="accent1"/>
+          </a:effectRef>
+          <a:fontRef idx="minor">
+            <a:schemeClr val="lt1"/>
+          </a:fontRef>
+        </p:style>
+        <p:txBody>
+          <a:bodyPr rtlCol="0" anchor="ctr"/>
+          <a:lstStyle/>
+          <a:p>
+            <a:pPr algn="ctr"/>
+            <a:endParaRPr lang="en-SG"/>
+          </a:p>
+        </p:txBody>
+      </p:sp>
+      <p:sp>
+        <p:nvSpPr>
+          <p:cNvPr id="38" name="Oval 37">
+            <a:extLst>
+              <a:ext uri="{FF2B5EF4-FFF2-40B4-BE49-F238E27FC236}">
+                <a16:creationId xmlns:a16="http://schemas.microsoft.com/office/drawing/2014/main" id="{416B6FA2-37C7-6518-5045-1E1D1869A00D}"/>
+              </a:ext>
+            </a:extLst>
+          </p:cNvPr>
+          <p:cNvSpPr/>
+          <p:nvPr/>
+        </p:nvSpPr>
+        <p:spPr>
+          <a:xfrm>
+            <a:off x="974161" y="3771561"/>
+            <a:ext cx="62346" cy="86009"/>
+          </a:xfrm>
+          <a:prstGeom prst="ellipse">
+            <a:avLst/>
+          </a:prstGeom>
+        </p:spPr>
+        <p:style>
+          <a:lnRef idx="2">
+            <a:schemeClr val="accent1">
+              <a:shade val="15000"/>
+            </a:schemeClr>
+          </a:lnRef>
+          <a:fillRef idx="1">
+            <a:schemeClr val="accent1"/>
+          </a:fillRef>
+          <a:effectRef idx="0">
+            <a:schemeClr val="accent1"/>
+          </a:effectRef>
+          <a:fontRef idx="minor">
+            <a:schemeClr val="lt1"/>
+          </a:fontRef>
+        </p:style>
+        <p:txBody>
+          <a:bodyPr rtlCol="0" anchor="ctr"/>
+          <a:lstStyle/>
+          <a:p>
+            <a:pPr algn="ctr"/>
+            <a:endParaRPr lang="en-SG"/>
+          </a:p>
+        </p:txBody>
+      </p:sp>
+      <p:pic>
+        <p:nvPicPr>
+          <p:cNvPr id="39" name="Graphic 38" descr="Wireless router with solid fill">
+            <a:extLst>
+              <a:ext uri="{FF2B5EF4-FFF2-40B4-BE49-F238E27FC236}">
+                <a16:creationId xmlns:a16="http://schemas.microsoft.com/office/drawing/2014/main" id="{8089DF6C-D64C-8CB5-F036-92DCA018C33E}"/>
+              </a:ext>
+            </a:extLst>
+          </p:cNvPr>
+          <p:cNvPicPr>
+            <a:picLocks noChangeAspect="1"/>
+          </p:cNvPicPr>
+          <p:nvPr/>
+        </p:nvPicPr>
+        <p:blipFill>
+          <a:blip r:embed="rId3">
+            <a:extLst>
+              <a:ext uri="{96DAC541-7B7A-43D3-8B79-37D633B846F1}">
+                <asvg:svgBlip xmlns:asvg="http://schemas.microsoft.com/office/drawing/2016/SVG/main" r:embed="rId4"/>
+              </a:ext>
+            </a:extLst>
+          </a:blip>
+          <a:stretch>
+            <a:fillRect/>
+          </a:stretch>
+        </p:blipFill>
+        <p:spPr>
+          <a:xfrm>
+            <a:off x="7493955" y="1399091"/>
+            <a:ext cx="329184" cy="329184"/>
+          </a:xfrm>
+          <a:prstGeom prst="rect">
+            <a:avLst/>
+          </a:prstGeom>
+        </p:spPr>
+      </p:pic>
+      <p:pic>
+        <p:nvPicPr>
+          <p:cNvPr id="40" name="Graphic 39" descr="Wireless router with solid fill">
+            <a:extLst>
+              <a:ext uri="{FF2B5EF4-FFF2-40B4-BE49-F238E27FC236}">
+                <a16:creationId xmlns:a16="http://schemas.microsoft.com/office/drawing/2014/main" id="{217FD2BE-9B67-4E99-C88A-25AC5279C953}"/>
+              </a:ext>
+            </a:extLst>
+          </p:cNvPr>
+          <p:cNvPicPr>
+            <a:picLocks noChangeAspect="1"/>
+          </p:cNvPicPr>
+          <p:nvPr/>
+        </p:nvPicPr>
+        <p:blipFill>
+          <a:blip r:embed="rId3">
+            <a:extLst>
+              <a:ext uri="{96DAC541-7B7A-43D3-8B79-37D633B846F1}">
+                <asvg:svgBlip xmlns:asvg="http://schemas.microsoft.com/office/drawing/2016/SVG/main" r:embed="rId4"/>
+              </a:ext>
+            </a:extLst>
+          </a:blip>
+          <a:stretch>
+            <a:fillRect/>
+          </a:stretch>
+        </p:blipFill>
+        <p:spPr>
+          <a:xfrm>
+            <a:off x="10317258" y="1381170"/>
+            <a:ext cx="329184" cy="329184"/>
+          </a:xfrm>
+          <a:prstGeom prst="rect">
+            <a:avLst/>
+          </a:prstGeom>
+        </p:spPr>
+      </p:pic>
+      <p:sp>
+        <p:nvSpPr>
+          <p:cNvPr id="41" name="Rectangle 40">
+            <a:extLst>
+              <a:ext uri="{FF2B5EF4-FFF2-40B4-BE49-F238E27FC236}">
+                <a16:creationId xmlns:a16="http://schemas.microsoft.com/office/drawing/2014/main" id="{CB379378-8672-CCB8-CF1A-F221D095F181}"/>
+              </a:ext>
+            </a:extLst>
+          </p:cNvPr>
+          <p:cNvSpPr/>
+          <p:nvPr/>
+        </p:nvSpPr>
+        <p:spPr>
+          <a:xfrm>
+            <a:off x="7109907" y="902819"/>
+            <a:ext cx="411479" cy="222033"/>
+          </a:xfrm>
+          <a:prstGeom prst="rect">
+            <a:avLst/>
+          </a:prstGeom>
+          <a:noFill/>
+        </p:spPr>
+        <p:style>
+          <a:lnRef idx="2">
+            <a:schemeClr val="accent1">
+              <a:shade val="15000"/>
+            </a:schemeClr>
+          </a:lnRef>
+          <a:fillRef idx="1">
+            <a:schemeClr val="accent1"/>
+          </a:fillRef>
+          <a:effectRef idx="0">
+            <a:schemeClr val="accent1"/>
+          </a:effectRef>
+          <a:fontRef idx="minor">
+            <a:schemeClr val="lt1"/>
+          </a:fontRef>
+        </p:style>
+        <p:txBody>
+          <a:bodyPr rtlCol="0" anchor="ctr"/>
+          <a:lstStyle/>
+          <a:p>
+            <a:pPr algn="ctr"/>
+            <a:endParaRPr lang="en-SG"/>
+          </a:p>
+        </p:txBody>
+      </p:sp>
+      <p:sp>
+        <p:nvSpPr>
+          <p:cNvPr id="42" name="Oval 41">
+            <a:extLst>
+              <a:ext uri="{FF2B5EF4-FFF2-40B4-BE49-F238E27FC236}">
+                <a16:creationId xmlns:a16="http://schemas.microsoft.com/office/drawing/2014/main" id="{0E2148FC-4E2D-E81E-890C-6BD199D5B581}"/>
+              </a:ext>
+            </a:extLst>
+          </p:cNvPr>
+          <p:cNvSpPr/>
+          <p:nvPr/>
+        </p:nvSpPr>
+        <p:spPr>
+          <a:xfrm>
+            <a:off x="7141910" y="937100"/>
+            <a:ext cx="164592" cy="153469"/>
+          </a:xfrm>
+          <a:prstGeom prst="ellipse">
+            <a:avLst/>
+          </a:prstGeom>
+          <a:solidFill>
+            <a:schemeClr val="accent6">
+              <a:lumMod val="75000"/>
+            </a:schemeClr>
+          </a:solidFill>
+        </p:spPr>
+        <p:style>
+          <a:lnRef idx="2">
+            <a:schemeClr val="accent1">
+              <a:shade val="15000"/>
+            </a:schemeClr>
+          </a:lnRef>
+          <a:fillRef idx="1">
+            <a:schemeClr val="accent1"/>
+          </a:fillRef>
+          <a:effectRef idx="0">
+            <a:schemeClr val="accent1"/>
+          </a:effectRef>
+          <a:fontRef idx="minor">
+            <a:schemeClr val="lt1"/>
+          </a:fontRef>
+        </p:style>
+        <p:txBody>
+          <a:bodyPr rtlCol="0" anchor="ctr"/>
+          <a:lstStyle/>
+          <a:p>
+            <a:pPr algn="ctr"/>
+            <a:endParaRPr lang="en-SG"/>
+          </a:p>
+        </p:txBody>
+      </p:sp>
+      <p:sp>
+        <p:nvSpPr>
+          <p:cNvPr id="43" name="Oval 42">
+            <a:extLst>
+              <a:ext uri="{FF2B5EF4-FFF2-40B4-BE49-F238E27FC236}">
+                <a16:creationId xmlns:a16="http://schemas.microsoft.com/office/drawing/2014/main" id="{7703AA88-B94C-9D2F-8B4C-77FECE74A5A7}"/>
+              </a:ext>
+            </a:extLst>
+          </p:cNvPr>
+          <p:cNvSpPr/>
+          <p:nvPr/>
+        </p:nvSpPr>
+        <p:spPr>
+          <a:xfrm>
+            <a:off x="7329363" y="937100"/>
+            <a:ext cx="164592" cy="153469"/>
+          </a:xfrm>
+          <a:prstGeom prst="ellipse">
+            <a:avLst/>
+          </a:prstGeom>
+          <a:noFill/>
+        </p:spPr>
+        <p:style>
+          <a:lnRef idx="2">
+            <a:schemeClr val="accent1">
+              <a:shade val="15000"/>
+            </a:schemeClr>
+          </a:lnRef>
+          <a:fillRef idx="1">
+            <a:schemeClr val="accent1"/>
+          </a:fillRef>
+          <a:effectRef idx="0">
+            <a:schemeClr val="accent1"/>
+          </a:effectRef>
+          <a:fontRef idx="minor">
+            <a:schemeClr val="lt1"/>
+          </a:fontRef>
+        </p:style>
+        <p:txBody>
+          <a:bodyPr rtlCol="0" anchor="ctr"/>
+          <a:lstStyle/>
+          <a:p>
+            <a:pPr algn="ctr"/>
+            <a:endParaRPr lang="en-SG"/>
+          </a:p>
+        </p:txBody>
+      </p:sp>
+      <p:cxnSp>
+        <p:nvCxnSpPr>
+          <p:cNvPr id="44" name="Straight Connector 43">
+            <a:extLst>
+              <a:ext uri="{FF2B5EF4-FFF2-40B4-BE49-F238E27FC236}">
+                <a16:creationId xmlns:a16="http://schemas.microsoft.com/office/drawing/2014/main" id="{DF924239-1E31-50E8-59FC-C8E37B2F3A6A}"/>
+              </a:ext>
+            </a:extLst>
+          </p:cNvPr>
+          <p:cNvCxnSpPr>
+            <a:cxnSpLocks/>
+            <a:stCxn id="41" idx="2"/>
+          </p:cNvCxnSpPr>
+          <p:nvPr/>
+        </p:nvCxnSpPr>
+        <p:spPr>
+          <a:xfrm flipH="1">
+            <a:off x="7315646" y="1124852"/>
+            <a:ext cx="1" cy="964594"/>
+          </a:xfrm>
+          <a:prstGeom prst="line">
+            <a:avLst/>
+          </a:prstGeom>
+        </p:spPr>
+        <p:style>
+          <a:lnRef idx="2">
+            <a:schemeClr val="accent1"/>
+          </a:lnRef>
+          <a:fillRef idx="0">
+            <a:schemeClr val="accent1"/>
+          </a:fillRef>
+          <a:effectRef idx="1">
+            <a:schemeClr val="accent1"/>
+          </a:effectRef>
+          <a:fontRef idx="minor">
+            <a:schemeClr val="tx1"/>
+          </a:fontRef>
+        </p:style>
+      </p:cxnSp>
+      <p:sp>
+        <p:nvSpPr>
+          <p:cNvPr id="45" name="Rectangle 44">
+            <a:extLst>
+              <a:ext uri="{FF2B5EF4-FFF2-40B4-BE49-F238E27FC236}">
+                <a16:creationId xmlns:a16="http://schemas.microsoft.com/office/drawing/2014/main" id="{DC9515C9-2141-BDEE-3C3B-8EC5083BD161}"/>
+              </a:ext>
+            </a:extLst>
+          </p:cNvPr>
+          <p:cNvSpPr/>
+          <p:nvPr/>
+        </p:nvSpPr>
+        <p:spPr>
+          <a:xfrm>
+            <a:off x="6905556" y="1728713"/>
+            <a:ext cx="4349541" cy="84388"/>
+          </a:xfrm>
+          <a:prstGeom prst="rect">
+            <a:avLst/>
+          </a:prstGeom>
+        </p:spPr>
+        <p:style>
+          <a:lnRef idx="2">
+            <a:schemeClr val="accent1">
+              <a:shade val="15000"/>
+            </a:schemeClr>
+          </a:lnRef>
+          <a:fillRef idx="1">
+            <a:schemeClr val="accent1"/>
+          </a:fillRef>
+          <a:effectRef idx="0">
+            <a:schemeClr val="accent1"/>
+          </a:effectRef>
+          <a:fontRef idx="minor">
+            <a:schemeClr val="lt1"/>
+          </a:fontRef>
+        </p:style>
+        <p:txBody>
+          <a:bodyPr rtlCol="0" anchor="ctr"/>
+          <a:lstStyle/>
+          <a:p>
+            <a:pPr algn="ctr"/>
+            <a:endParaRPr lang="en-SG"/>
+          </a:p>
+        </p:txBody>
+      </p:sp>
+      <p:pic>
+        <p:nvPicPr>
+          <p:cNvPr id="46" name="Picture 45">
+            <a:extLst>
+              <a:ext uri="{FF2B5EF4-FFF2-40B4-BE49-F238E27FC236}">
+                <a16:creationId xmlns:a16="http://schemas.microsoft.com/office/drawing/2014/main" id="{F697A6EF-3FFB-CAFF-9324-EC0D806F1FC5}"/>
+              </a:ext>
+            </a:extLst>
+          </p:cNvPr>
+          <p:cNvPicPr>
+            <a:picLocks noChangeAspect="1"/>
+          </p:cNvPicPr>
+          <p:nvPr/>
+        </p:nvPicPr>
+        <p:blipFill>
+          <a:blip r:embed="rId5"/>
+          <a:stretch>
+            <a:fillRect/>
+          </a:stretch>
+        </p:blipFill>
+        <p:spPr>
+          <a:xfrm>
+            <a:off x="8412614" y="3028533"/>
+            <a:ext cx="3200000" cy="1419048"/>
+          </a:xfrm>
+          <a:prstGeom prst="rect">
+            <a:avLst/>
+          </a:prstGeom>
+        </p:spPr>
+      </p:pic>
+      <p:pic>
+        <p:nvPicPr>
+          <p:cNvPr id="47" name="Picture 46">
+            <a:extLst>
+              <a:ext uri="{FF2B5EF4-FFF2-40B4-BE49-F238E27FC236}">
+                <a16:creationId xmlns:a16="http://schemas.microsoft.com/office/drawing/2014/main" id="{2353953A-CCE5-76CE-B51B-6DD5B8778029}"/>
+              </a:ext>
+            </a:extLst>
+          </p:cNvPr>
+          <p:cNvPicPr>
+            <a:picLocks noChangeAspect="1"/>
+          </p:cNvPicPr>
+          <p:nvPr/>
+        </p:nvPicPr>
+        <p:blipFill>
+          <a:blip r:embed="rId6"/>
+          <a:stretch>
+            <a:fillRect/>
+          </a:stretch>
+        </p:blipFill>
+        <p:spPr>
+          <a:xfrm>
+            <a:off x="7024028" y="3570774"/>
+            <a:ext cx="939854" cy="939854"/>
+          </a:xfrm>
+          <a:prstGeom prst="rect">
+            <a:avLst/>
+          </a:prstGeom>
+        </p:spPr>
+      </p:pic>
+      <p:sp>
+        <p:nvSpPr>
+          <p:cNvPr id="48" name="TextBox 47">
+            <a:extLst>
+              <a:ext uri="{FF2B5EF4-FFF2-40B4-BE49-F238E27FC236}">
+                <a16:creationId xmlns:a16="http://schemas.microsoft.com/office/drawing/2014/main" id="{8C36D7CD-FA15-6100-EAAC-3E3C3ED86976}"/>
+              </a:ext>
+            </a:extLst>
+          </p:cNvPr>
+          <p:cNvSpPr txBox="1"/>
+          <p:nvPr/>
+        </p:nvSpPr>
+        <p:spPr>
+          <a:xfrm>
+            <a:off x="7474993" y="1190160"/>
+            <a:ext cx="1139639" cy="261610"/>
+          </a:xfrm>
+          <a:prstGeom prst="rect">
+            <a:avLst/>
+          </a:prstGeom>
+          <a:noFill/>
+        </p:spPr>
+        <p:txBody>
+          <a:bodyPr wrap="square">
+            <a:spAutoFit/>
+          </a:bodyPr>
+          <a:lstStyle/>
+          <a:p>
+            <a:r>
+              <a:rPr lang="en-US" sz="1100" b="1" dirty="0"/>
+              <a:t>Sensor(n)</a:t>
+            </a:r>
+            <a:endParaRPr lang="en-SG" sz="1100" b="1" dirty="0"/>
+          </a:p>
+        </p:txBody>
+      </p:sp>
+      <p:sp>
+        <p:nvSpPr>
+          <p:cNvPr id="49" name="TextBox 48">
+            <a:extLst>
+              <a:ext uri="{FF2B5EF4-FFF2-40B4-BE49-F238E27FC236}">
+                <a16:creationId xmlns:a16="http://schemas.microsoft.com/office/drawing/2014/main" id="{C71E109D-92B0-5D8E-7E14-5D93DF36FBC5}"/>
+              </a:ext>
+            </a:extLst>
+          </p:cNvPr>
+          <p:cNvSpPr txBox="1"/>
+          <p:nvPr/>
+        </p:nvSpPr>
+        <p:spPr>
+          <a:xfrm>
+            <a:off x="10076622" y="1206586"/>
+            <a:ext cx="1139639" cy="261610"/>
+          </a:xfrm>
+          <a:prstGeom prst="rect">
+            <a:avLst/>
+          </a:prstGeom>
+          <a:noFill/>
+        </p:spPr>
+        <p:txBody>
+          <a:bodyPr wrap="square">
+            <a:spAutoFit/>
+          </a:bodyPr>
+          <a:lstStyle/>
+          <a:p>
+            <a:r>
+              <a:rPr lang="en-US" sz="1100" b="1" dirty="0"/>
+              <a:t>Sensor(n+1)</a:t>
+            </a:r>
+            <a:endParaRPr lang="en-SG" sz="1100" b="1" dirty="0"/>
+          </a:p>
+        </p:txBody>
+      </p:sp>
+      <p:sp>
+        <p:nvSpPr>
+          <p:cNvPr id="50" name="TextBox 49">
+            <a:extLst>
+              <a:ext uri="{FF2B5EF4-FFF2-40B4-BE49-F238E27FC236}">
+                <a16:creationId xmlns:a16="http://schemas.microsoft.com/office/drawing/2014/main" id="{296BDD36-DF68-B78F-DBE6-2CA0A7AEF666}"/>
+              </a:ext>
+            </a:extLst>
+          </p:cNvPr>
+          <p:cNvSpPr txBox="1"/>
+          <p:nvPr/>
+        </p:nvSpPr>
+        <p:spPr>
+          <a:xfrm>
+            <a:off x="6951566" y="561312"/>
+            <a:ext cx="1139639" cy="261610"/>
+          </a:xfrm>
+          <a:prstGeom prst="rect">
+            <a:avLst/>
+          </a:prstGeom>
+          <a:noFill/>
+        </p:spPr>
+        <p:txBody>
+          <a:bodyPr wrap="square">
+            <a:spAutoFit/>
+          </a:bodyPr>
+          <a:lstStyle/>
+          <a:p>
+            <a:r>
+              <a:rPr lang="en-US" sz="1100" b="1" dirty="0"/>
+              <a:t>Signal(n)</a:t>
+            </a:r>
+            <a:endParaRPr lang="en-SG" sz="1100" b="1" dirty="0"/>
+          </a:p>
+        </p:txBody>
+      </p:sp>
+      <p:cxnSp>
+        <p:nvCxnSpPr>
+          <p:cNvPr id="51" name="Straight Connector 50">
+            <a:extLst>
+              <a:ext uri="{FF2B5EF4-FFF2-40B4-BE49-F238E27FC236}">
+                <a16:creationId xmlns:a16="http://schemas.microsoft.com/office/drawing/2014/main" id="{E6B4A189-E8CF-E84A-D73C-F39260B6D953}"/>
+              </a:ext>
+            </a:extLst>
+          </p:cNvPr>
+          <p:cNvCxnSpPr/>
+          <p:nvPr/>
+        </p:nvCxnSpPr>
+        <p:spPr>
+          <a:xfrm>
+            <a:off x="6982919" y="2089446"/>
+            <a:ext cx="4194813" cy="0"/>
+          </a:xfrm>
+          <a:prstGeom prst="line">
+            <a:avLst/>
+          </a:prstGeom>
+        </p:spPr>
+        <p:style>
+          <a:lnRef idx="2">
+            <a:schemeClr val="accent1"/>
+          </a:lnRef>
+          <a:fillRef idx="0">
+            <a:schemeClr val="accent1"/>
+          </a:fillRef>
+          <a:effectRef idx="1">
+            <a:schemeClr val="accent1"/>
+          </a:effectRef>
+          <a:fontRef idx="minor">
+            <a:schemeClr val="tx1"/>
+          </a:fontRef>
+        </p:style>
+      </p:cxnSp>
+      <p:cxnSp>
+        <p:nvCxnSpPr>
+          <p:cNvPr id="52" name="Straight Connector 51">
+            <a:extLst>
+              <a:ext uri="{FF2B5EF4-FFF2-40B4-BE49-F238E27FC236}">
+                <a16:creationId xmlns:a16="http://schemas.microsoft.com/office/drawing/2014/main" id="{048FF2D0-4008-983F-6A8A-1E593C5846DF}"/>
+              </a:ext>
+            </a:extLst>
+          </p:cNvPr>
+          <p:cNvCxnSpPr>
+            <a:cxnSpLocks/>
+          </p:cNvCxnSpPr>
+          <p:nvPr/>
+        </p:nvCxnSpPr>
+        <p:spPr>
+          <a:xfrm>
+            <a:off x="6905556" y="2278422"/>
+            <a:ext cx="4272175" cy="0"/>
+          </a:xfrm>
+          <a:prstGeom prst="line">
+            <a:avLst/>
+          </a:prstGeom>
+          <a:ln>
+            <a:solidFill>
+              <a:schemeClr val="accent5">
+                <a:lumMod val="75000"/>
+              </a:schemeClr>
+            </a:solidFill>
+          </a:ln>
+        </p:spPr>
+        <p:style>
+          <a:lnRef idx="2">
+            <a:schemeClr val="accent1"/>
+          </a:lnRef>
+          <a:fillRef idx="0">
+            <a:schemeClr val="accent1"/>
+          </a:fillRef>
+          <a:effectRef idx="1">
+            <a:schemeClr val="accent1"/>
+          </a:effectRef>
+          <a:fontRef idx="minor">
+            <a:schemeClr val="tx1"/>
+          </a:fontRef>
+        </p:style>
+      </p:cxnSp>
+      <p:cxnSp>
+        <p:nvCxnSpPr>
+          <p:cNvPr id="53" name="Straight Connector 52">
+            <a:extLst>
+              <a:ext uri="{FF2B5EF4-FFF2-40B4-BE49-F238E27FC236}">
+                <a16:creationId xmlns:a16="http://schemas.microsoft.com/office/drawing/2014/main" id="{2C3A8CDA-694B-3D7C-102C-6D17C82CB599}"/>
+              </a:ext>
+            </a:extLst>
+          </p:cNvPr>
+          <p:cNvCxnSpPr>
+            <a:cxnSpLocks/>
+          </p:cNvCxnSpPr>
+          <p:nvPr/>
+        </p:nvCxnSpPr>
+        <p:spPr>
+          <a:xfrm>
+            <a:off x="6905556" y="2479590"/>
+            <a:ext cx="4272175" cy="0"/>
+          </a:xfrm>
+          <a:prstGeom prst="line">
+            <a:avLst/>
+          </a:prstGeom>
+          <a:ln>
+            <a:solidFill>
+              <a:schemeClr val="accent2">
+                <a:lumMod val="75000"/>
+              </a:schemeClr>
+            </a:solidFill>
+          </a:ln>
+        </p:spPr>
+        <p:style>
+          <a:lnRef idx="2">
+            <a:schemeClr val="accent1"/>
+          </a:lnRef>
+          <a:fillRef idx="0">
+            <a:schemeClr val="accent1"/>
+          </a:fillRef>
+          <a:effectRef idx="1">
+            <a:schemeClr val="accent1"/>
+          </a:effectRef>
+          <a:fontRef idx="minor">
+            <a:schemeClr val="tx1"/>
+          </a:fontRef>
+        </p:style>
+      </p:cxnSp>
+      <p:cxnSp>
+        <p:nvCxnSpPr>
+          <p:cNvPr id="54" name="Straight Connector 53">
+            <a:extLst>
+              <a:ext uri="{FF2B5EF4-FFF2-40B4-BE49-F238E27FC236}">
+                <a16:creationId xmlns:a16="http://schemas.microsoft.com/office/drawing/2014/main" id="{2A383277-BF66-8E38-42EF-0F5F5FC86457}"/>
+              </a:ext>
+            </a:extLst>
+          </p:cNvPr>
+          <p:cNvCxnSpPr>
+            <a:cxnSpLocks/>
+          </p:cNvCxnSpPr>
+          <p:nvPr/>
+        </p:nvCxnSpPr>
+        <p:spPr>
+          <a:xfrm>
+            <a:off x="7658547" y="1687125"/>
+            <a:ext cx="0" cy="575359"/>
+          </a:xfrm>
+          <a:prstGeom prst="line">
+            <a:avLst/>
+          </a:prstGeom>
+          <a:ln>
+            <a:solidFill>
+              <a:schemeClr val="accent5">
+                <a:lumMod val="75000"/>
+              </a:schemeClr>
+            </a:solidFill>
+          </a:ln>
+        </p:spPr>
+        <p:style>
+          <a:lnRef idx="2">
+            <a:schemeClr val="accent1"/>
+          </a:lnRef>
+          <a:fillRef idx="0">
+            <a:schemeClr val="accent1"/>
+          </a:fillRef>
+          <a:effectRef idx="1">
+            <a:schemeClr val="accent1"/>
+          </a:effectRef>
+          <a:fontRef idx="minor">
+            <a:schemeClr val="tx1"/>
+          </a:fontRef>
+        </p:style>
+      </p:cxnSp>
+      <p:cxnSp>
+        <p:nvCxnSpPr>
+          <p:cNvPr id="55" name="Straight Connector 54">
+            <a:extLst>
+              <a:ext uri="{FF2B5EF4-FFF2-40B4-BE49-F238E27FC236}">
+                <a16:creationId xmlns:a16="http://schemas.microsoft.com/office/drawing/2014/main" id="{B4A85AC9-7785-88E1-5D71-BB525A72BBCD}"/>
+              </a:ext>
+            </a:extLst>
+          </p:cNvPr>
+          <p:cNvCxnSpPr>
+            <a:cxnSpLocks/>
+          </p:cNvCxnSpPr>
+          <p:nvPr/>
+        </p:nvCxnSpPr>
+        <p:spPr>
+          <a:xfrm>
+            <a:off x="10481850" y="1813101"/>
+            <a:ext cx="0" cy="666489"/>
+          </a:xfrm>
+          <a:prstGeom prst="line">
+            <a:avLst/>
+          </a:prstGeom>
+          <a:ln>
+            <a:solidFill>
+              <a:schemeClr val="accent2">
+                <a:lumMod val="75000"/>
+              </a:schemeClr>
+            </a:solidFill>
+          </a:ln>
+        </p:spPr>
+        <p:style>
+          <a:lnRef idx="2">
+            <a:schemeClr val="accent1"/>
+          </a:lnRef>
+          <a:fillRef idx="0">
+            <a:schemeClr val="accent1"/>
+          </a:fillRef>
+          <a:effectRef idx="1">
+            <a:schemeClr val="accent1"/>
+          </a:effectRef>
+          <a:fontRef idx="minor">
+            <a:schemeClr val="tx1"/>
+          </a:fontRef>
+        </p:style>
+      </p:cxnSp>
+      <p:cxnSp>
+        <p:nvCxnSpPr>
+          <p:cNvPr id="56" name="Straight Connector 55">
+            <a:extLst>
+              <a:ext uri="{FF2B5EF4-FFF2-40B4-BE49-F238E27FC236}">
+                <a16:creationId xmlns:a16="http://schemas.microsoft.com/office/drawing/2014/main" id="{1C417DA1-6302-9D6F-4E3E-A9EAA229F2EF}"/>
+              </a:ext>
+            </a:extLst>
+          </p:cNvPr>
+          <p:cNvCxnSpPr>
+            <a:cxnSpLocks/>
+          </p:cNvCxnSpPr>
+          <p:nvPr/>
+        </p:nvCxnSpPr>
+        <p:spPr>
+          <a:xfrm>
+            <a:off x="11154162" y="2072057"/>
+            <a:ext cx="0" cy="1309741"/>
+          </a:xfrm>
+          <a:prstGeom prst="line">
+            <a:avLst/>
+          </a:prstGeom>
+        </p:spPr>
+        <p:style>
+          <a:lnRef idx="2">
+            <a:schemeClr val="accent1"/>
+          </a:lnRef>
+          <a:fillRef idx="0">
+            <a:schemeClr val="accent1"/>
+          </a:fillRef>
+          <a:effectRef idx="1">
+            <a:schemeClr val="accent1"/>
+          </a:effectRef>
+          <a:fontRef idx="minor">
+            <a:schemeClr val="tx1"/>
+          </a:fontRef>
+        </p:style>
+      </p:cxnSp>
+      <p:cxnSp>
+        <p:nvCxnSpPr>
+          <p:cNvPr id="57" name="Straight Connector 56">
+            <a:extLst>
+              <a:ext uri="{FF2B5EF4-FFF2-40B4-BE49-F238E27FC236}">
+                <a16:creationId xmlns:a16="http://schemas.microsoft.com/office/drawing/2014/main" id="{C5076F85-31D3-AA34-4200-7B67723819D8}"/>
+              </a:ext>
+            </a:extLst>
+          </p:cNvPr>
+          <p:cNvCxnSpPr>
+            <a:cxnSpLocks/>
+          </p:cNvCxnSpPr>
+          <p:nvPr/>
+        </p:nvCxnSpPr>
+        <p:spPr>
+          <a:xfrm>
+            <a:off x="8230656" y="2479590"/>
+            <a:ext cx="0" cy="1818995"/>
+          </a:xfrm>
+          <a:prstGeom prst="line">
+            <a:avLst/>
+          </a:prstGeom>
+          <a:ln>
+            <a:solidFill>
+              <a:schemeClr val="accent2">
+                <a:lumMod val="75000"/>
+              </a:schemeClr>
+            </a:solidFill>
+          </a:ln>
+        </p:spPr>
+        <p:style>
+          <a:lnRef idx="2">
+            <a:schemeClr val="accent1"/>
+          </a:lnRef>
+          <a:fillRef idx="0">
+            <a:schemeClr val="accent1"/>
+          </a:fillRef>
+          <a:effectRef idx="1">
+            <a:schemeClr val="accent1"/>
+          </a:effectRef>
+          <a:fontRef idx="minor">
+            <a:schemeClr val="tx1"/>
+          </a:fontRef>
+        </p:style>
+      </p:cxnSp>
+      <p:cxnSp>
+        <p:nvCxnSpPr>
+          <p:cNvPr id="58" name="Straight Connector 57">
+            <a:extLst>
+              <a:ext uri="{FF2B5EF4-FFF2-40B4-BE49-F238E27FC236}">
+                <a16:creationId xmlns:a16="http://schemas.microsoft.com/office/drawing/2014/main" id="{E6687786-DBD0-FCCF-7B51-5B4351146CDD}"/>
+              </a:ext>
+            </a:extLst>
+          </p:cNvPr>
+          <p:cNvCxnSpPr>
+            <a:cxnSpLocks/>
+          </p:cNvCxnSpPr>
+          <p:nvPr/>
+        </p:nvCxnSpPr>
+        <p:spPr>
+          <a:xfrm>
+            <a:off x="8230656" y="4298585"/>
+            <a:ext cx="519008" cy="0"/>
+          </a:xfrm>
+          <a:prstGeom prst="line">
+            <a:avLst/>
+          </a:prstGeom>
+          <a:ln>
+            <a:solidFill>
+              <a:schemeClr val="accent2">
+                <a:lumMod val="75000"/>
+              </a:schemeClr>
+            </a:solidFill>
+          </a:ln>
+        </p:spPr>
+        <p:style>
+          <a:lnRef idx="2">
+            <a:schemeClr val="accent1"/>
+          </a:lnRef>
+          <a:fillRef idx="0">
+            <a:schemeClr val="accent1"/>
+          </a:fillRef>
+          <a:effectRef idx="1">
+            <a:schemeClr val="accent1"/>
+          </a:effectRef>
+          <a:fontRef idx="minor">
+            <a:schemeClr val="tx1"/>
+          </a:fontRef>
+        </p:style>
+      </p:cxnSp>
+      <p:cxnSp>
+        <p:nvCxnSpPr>
+          <p:cNvPr id="59" name="Straight Connector 58">
+            <a:extLst>
+              <a:ext uri="{FF2B5EF4-FFF2-40B4-BE49-F238E27FC236}">
+                <a16:creationId xmlns:a16="http://schemas.microsoft.com/office/drawing/2014/main" id="{8C3DC6EB-23E8-7CB0-9E32-90365DEC2413}"/>
+              </a:ext>
+            </a:extLst>
+          </p:cNvPr>
+          <p:cNvCxnSpPr>
+            <a:cxnSpLocks/>
+          </p:cNvCxnSpPr>
+          <p:nvPr/>
+        </p:nvCxnSpPr>
+        <p:spPr>
+          <a:xfrm>
+            <a:off x="8789355" y="2278422"/>
+            <a:ext cx="0" cy="999744"/>
+          </a:xfrm>
+          <a:prstGeom prst="line">
+            <a:avLst/>
+          </a:prstGeom>
+          <a:ln>
+            <a:solidFill>
+              <a:schemeClr val="accent5">
+                <a:lumMod val="75000"/>
+              </a:schemeClr>
+            </a:solidFill>
+          </a:ln>
+        </p:spPr>
+        <p:style>
+          <a:lnRef idx="2">
+            <a:schemeClr val="accent1"/>
+          </a:lnRef>
+          <a:fillRef idx="0">
+            <a:schemeClr val="accent1"/>
+          </a:fillRef>
+          <a:effectRef idx="1">
+            <a:schemeClr val="accent1"/>
+          </a:effectRef>
+          <a:fontRef idx="minor">
+            <a:schemeClr val="tx1"/>
+          </a:fontRef>
+        </p:style>
+      </p:cxnSp>
+      <p:cxnSp>
+        <p:nvCxnSpPr>
+          <p:cNvPr id="60" name="Straight Connector 59">
+            <a:extLst>
+              <a:ext uri="{FF2B5EF4-FFF2-40B4-BE49-F238E27FC236}">
+                <a16:creationId xmlns:a16="http://schemas.microsoft.com/office/drawing/2014/main" id="{C28E7932-0B83-E8EC-73C6-CB7EFD02F0B3}"/>
+              </a:ext>
+            </a:extLst>
+          </p:cNvPr>
+          <p:cNvCxnSpPr/>
+          <p:nvPr/>
+        </p:nvCxnSpPr>
+        <p:spPr>
+          <a:xfrm flipH="1">
+            <a:off x="7880418" y="3811209"/>
+            <a:ext cx="937647" cy="0"/>
+          </a:xfrm>
+          <a:prstGeom prst="line">
+            <a:avLst/>
+          </a:prstGeom>
+          <a:ln>
+            <a:solidFill>
+              <a:schemeClr val="tx1"/>
+            </a:solidFill>
+          </a:ln>
+        </p:spPr>
+        <p:style>
+          <a:lnRef idx="2">
+            <a:schemeClr val="accent1"/>
+          </a:lnRef>
+          <a:fillRef idx="0">
+            <a:schemeClr val="accent1"/>
+          </a:fillRef>
+          <a:effectRef idx="1">
+            <a:schemeClr val="accent1"/>
+          </a:effectRef>
+          <a:fontRef idx="minor">
+            <a:schemeClr val="tx1"/>
+          </a:fontRef>
+        </p:style>
+      </p:cxnSp>
+      <p:pic>
+        <p:nvPicPr>
+          <p:cNvPr id="61" name="Picture 60">
+            <a:extLst>
+              <a:ext uri="{FF2B5EF4-FFF2-40B4-BE49-F238E27FC236}">
+                <a16:creationId xmlns:a16="http://schemas.microsoft.com/office/drawing/2014/main" id="{0B28C2DA-D6FE-4D2A-47D7-AB74AC0E0025}"/>
+              </a:ext>
+            </a:extLst>
+          </p:cNvPr>
+          <p:cNvPicPr>
+            <a:picLocks noChangeAspect="1"/>
+          </p:cNvPicPr>
+          <p:nvPr/>
+        </p:nvPicPr>
+        <p:blipFill>
+          <a:blip r:embed="rId7">
+            <a:extLst>
+              <a:ext uri="{28A0092B-C50C-407E-A947-70E740481C1C}">
+                <a14:useLocalDpi xmlns:a14="http://schemas.microsoft.com/office/drawing/2010/main" val="0"/>
+              </a:ext>
+            </a:extLst>
+          </a:blip>
+          <a:stretch>
+            <a:fillRect/>
+          </a:stretch>
+        </p:blipFill>
+        <p:spPr>
+          <a:xfrm rot="5400000">
+            <a:off x="6858319" y="2643707"/>
+            <a:ext cx="476190" cy="409524"/>
+          </a:xfrm>
+          <a:prstGeom prst="rect">
+            <a:avLst/>
+          </a:prstGeom>
+        </p:spPr>
+      </p:pic>
+      <p:cxnSp>
+        <p:nvCxnSpPr>
+          <p:cNvPr id="62" name="Straight Connector 61">
+            <a:extLst>
+              <a:ext uri="{FF2B5EF4-FFF2-40B4-BE49-F238E27FC236}">
+                <a16:creationId xmlns:a16="http://schemas.microsoft.com/office/drawing/2014/main" id="{C7F86CC5-BC4D-A852-CFE3-DA8E49302798}"/>
+              </a:ext>
+            </a:extLst>
+          </p:cNvPr>
+          <p:cNvCxnSpPr>
+            <a:cxnSpLocks/>
+          </p:cNvCxnSpPr>
+          <p:nvPr/>
+        </p:nvCxnSpPr>
+        <p:spPr>
+          <a:xfrm flipH="1" flipV="1">
+            <a:off x="7042176" y="3596596"/>
+            <a:ext cx="0" cy="206166"/>
+          </a:xfrm>
+          <a:prstGeom prst="line">
+            <a:avLst/>
+          </a:prstGeom>
+          <a:ln>
+            <a:solidFill>
+              <a:schemeClr val="tx1"/>
+            </a:solidFill>
+          </a:ln>
+        </p:spPr>
+        <p:style>
+          <a:lnRef idx="2">
+            <a:schemeClr val="accent1"/>
+          </a:lnRef>
+          <a:fillRef idx="0">
+            <a:schemeClr val="accent1"/>
+          </a:fillRef>
+          <a:effectRef idx="1">
+            <a:schemeClr val="accent1"/>
+          </a:effectRef>
+          <a:fontRef idx="minor">
+            <a:schemeClr val="tx1"/>
+          </a:fontRef>
+        </p:style>
+      </p:cxnSp>
+      <p:cxnSp>
+        <p:nvCxnSpPr>
+          <p:cNvPr id="63" name="Straight Connector 62">
+            <a:extLst>
+              <a:ext uri="{FF2B5EF4-FFF2-40B4-BE49-F238E27FC236}">
+                <a16:creationId xmlns:a16="http://schemas.microsoft.com/office/drawing/2014/main" id="{8BC4EBBF-6620-DF5D-0C69-06D487AD19FB}"/>
+              </a:ext>
+            </a:extLst>
+          </p:cNvPr>
+          <p:cNvCxnSpPr>
+            <a:cxnSpLocks/>
+          </p:cNvCxnSpPr>
+          <p:nvPr/>
+        </p:nvCxnSpPr>
+        <p:spPr>
+          <a:xfrm>
+            <a:off x="7030274" y="2278995"/>
+            <a:ext cx="806" cy="387046"/>
+          </a:xfrm>
+          <a:prstGeom prst="line">
+            <a:avLst/>
+          </a:prstGeom>
+          <a:ln>
+            <a:solidFill>
+              <a:schemeClr val="accent5">
+                <a:lumMod val="75000"/>
+              </a:schemeClr>
+            </a:solidFill>
+          </a:ln>
+        </p:spPr>
+        <p:style>
+          <a:lnRef idx="2">
+            <a:schemeClr val="accent1"/>
+          </a:lnRef>
+          <a:fillRef idx="0">
+            <a:schemeClr val="accent1"/>
+          </a:fillRef>
+          <a:effectRef idx="1">
+            <a:schemeClr val="accent1"/>
+          </a:effectRef>
+          <a:fontRef idx="minor">
+            <a:schemeClr val="tx1"/>
+          </a:fontRef>
+        </p:style>
+      </p:cxnSp>
+      <p:cxnSp>
+        <p:nvCxnSpPr>
+          <p:cNvPr id="64" name="Straight Connector 63">
+            <a:extLst>
+              <a:ext uri="{FF2B5EF4-FFF2-40B4-BE49-F238E27FC236}">
+                <a16:creationId xmlns:a16="http://schemas.microsoft.com/office/drawing/2014/main" id="{D857D925-26EB-A882-FA84-4B3EC0B1F301}"/>
+              </a:ext>
+            </a:extLst>
+          </p:cNvPr>
+          <p:cNvCxnSpPr>
+            <a:cxnSpLocks/>
+          </p:cNvCxnSpPr>
+          <p:nvPr/>
+        </p:nvCxnSpPr>
+        <p:spPr>
+          <a:xfrm flipH="1">
+            <a:off x="7176195" y="2480163"/>
+            <a:ext cx="5654" cy="176689"/>
+          </a:xfrm>
+          <a:prstGeom prst="line">
+            <a:avLst/>
+          </a:prstGeom>
+          <a:ln>
+            <a:solidFill>
+              <a:schemeClr val="accent2">
+                <a:lumMod val="75000"/>
+              </a:schemeClr>
+            </a:solidFill>
+          </a:ln>
+        </p:spPr>
+        <p:style>
+          <a:lnRef idx="2">
+            <a:schemeClr val="accent1"/>
+          </a:lnRef>
+          <a:fillRef idx="0">
+            <a:schemeClr val="accent1"/>
+          </a:fillRef>
+          <a:effectRef idx="1">
+            <a:schemeClr val="accent1"/>
+          </a:effectRef>
+          <a:fontRef idx="minor">
+            <a:schemeClr val="tx1"/>
+          </a:fontRef>
+        </p:style>
+      </p:cxnSp>
+      <p:sp>
+        <p:nvSpPr>
+          <p:cNvPr id="65" name="Oval 64">
+            <a:extLst>
+              <a:ext uri="{FF2B5EF4-FFF2-40B4-BE49-F238E27FC236}">
+                <a16:creationId xmlns:a16="http://schemas.microsoft.com/office/drawing/2014/main" id="{95CF9F51-666B-4C9C-78CF-79D664D0D1CA}"/>
+              </a:ext>
+            </a:extLst>
+          </p:cNvPr>
+          <p:cNvSpPr/>
+          <p:nvPr/>
+        </p:nvSpPr>
+        <p:spPr>
+          <a:xfrm>
+            <a:off x="7005992" y="2250566"/>
+            <a:ext cx="62346" cy="86009"/>
+          </a:xfrm>
+          <a:prstGeom prst="ellipse">
+            <a:avLst/>
+          </a:prstGeom>
+        </p:spPr>
+        <p:style>
+          <a:lnRef idx="2">
+            <a:schemeClr val="accent1">
+              <a:shade val="15000"/>
+            </a:schemeClr>
+          </a:lnRef>
+          <a:fillRef idx="1">
+            <a:schemeClr val="accent1"/>
+          </a:fillRef>
+          <a:effectRef idx="0">
+            <a:schemeClr val="accent1"/>
+          </a:effectRef>
+          <a:fontRef idx="minor">
+            <a:schemeClr val="lt1"/>
+          </a:fontRef>
+        </p:style>
+        <p:txBody>
+          <a:bodyPr rtlCol="0" anchor="ctr"/>
+          <a:lstStyle/>
+          <a:p>
+            <a:pPr algn="ctr"/>
+            <a:endParaRPr lang="en-SG"/>
+          </a:p>
+        </p:txBody>
+      </p:sp>
+      <p:sp>
+        <p:nvSpPr>
+          <p:cNvPr id="66" name="Oval 65">
+            <a:extLst>
+              <a:ext uri="{FF2B5EF4-FFF2-40B4-BE49-F238E27FC236}">
+                <a16:creationId xmlns:a16="http://schemas.microsoft.com/office/drawing/2014/main" id="{2DFB714A-EF23-D827-3010-C725CAB5AA9F}"/>
+              </a:ext>
+            </a:extLst>
+          </p:cNvPr>
+          <p:cNvSpPr/>
+          <p:nvPr/>
+        </p:nvSpPr>
+        <p:spPr>
+          <a:xfrm>
+            <a:off x="7276685" y="2029052"/>
+            <a:ext cx="62346" cy="86009"/>
+          </a:xfrm>
+          <a:prstGeom prst="ellipse">
+            <a:avLst/>
+          </a:prstGeom>
+        </p:spPr>
+        <p:style>
+          <a:lnRef idx="2">
+            <a:schemeClr val="accent1">
+              <a:shade val="15000"/>
+            </a:schemeClr>
+          </a:lnRef>
+          <a:fillRef idx="1">
+            <a:schemeClr val="accent1"/>
+          </a:fillRef>
+          <a:effectRef idx="0">
+            <a:schemeClr val="accent1"/>
+          </a:effectRef>
+          <a:fontRef idx="minor">
+            <a:schemeClr val="lt1"/>
+          </a:fontRef>
+        </p:style>
+        <p:txBody>
+          <a:bodyPr rtlCol="0" anchor="ctr"/>
+          <a:lstStyle/>
+          <a:p>
+            <a:pPr algn="ctr"/>
+            <a:endParaRPr lang="en-SG"/>
+          </a:p>
+        </p:txBody>
+      </p:sp>
+      <p:sp>
+        <p:nvSpPr>
+          <p:cNvPr id="67" name="Oval 66">
+            <a:extLst>
+              <a:ext uri="{FF2B5EF4-FFF2-40B4-BE49-F238E27FC236}">
+                <a16:creationId xmlns:a16="http://schemas.microsoft.com/office/drawing/2014/main" id="{670DF3CA-BA6E-6196-0557-5DB41D10BB9F}"/>
+              </a:ext>
+            </a:extLst>
+          </p:cNvPr>
+          <p:cNvSpPr/>
+          <p:nvPr/>
+        </p:nvSpPr>
+        <p:spPr>
+          <a:xfrm>
+            <a:off x="7630661" y="2241446"/>
+            <a:ext cx="62346" cy="86009"/>
+          </a:xfrm>
+          <a:prstGeom prst="ellipse">
+            <a:avLst/>
+          </a:prstGeom>
+        </p:spPr>
+        <p:style>
+          <a:lnRef idx="2">
+            <a:schemeClr val="accent1">
+              <a:shade val="15000"/>
+            </a:schemeClr>
+          </a:lnRef>
+          <a:fillRef idx="1">
+            <a:schemeClr val="accent1"/>
+          </a:fillRef>
+          <a:effectRef idx="0">
+            <a:schemeClr val="accent1"/>
+          </a:effectRef>
+          <a:fontRef idx="minor">
+            <a:schemeClr val="lt1"/>
+          </a:fontRef>
+        </p:style>
+        <p:txBody>
+          <a:bodyPr rtlCol="0" anchor="ctr"/>
+          <a:lstStyle/>
+          <a:p>
+            <a:pPr algn="ctr"/>
+            <a:endParaRPr lang="en-SG"/>
+          </a:p>
+        </p:txBody>
+      </p:sp>
+      <p:sp>
+        <p:nvSpPr>
+          <p:cNvPr id="68" name="Oval 67">
+            <a:extLst>
+              <a:ext uri="{FF2B5EF4-FFF2-40B4-BE49-F238E27FC236}">
+                <a16:creationId xmlns:a16="http://schemas.microsoft.com/office/drawing/2014/main" id="{C34B45F7-EADA-2878-464B-9DF937712D2B}"/>
+              </a:ext>
+            </a:extLst>
+          </p:cNvPr>
+          <p:cNvSpPr/>
+          <p:nvPr/>
+        </p:nvSpPr>
+        <p:spPr>
+          <a:xfrm>
+            <a:off x="7150676" y="2444867"/>
+            <a:ext cx="62346" cy="86009"/>
+          </a:xfrm>
+          <a:prstGeom prst="ellipse">
+            <a:avLst/>
+          </a:prstGeom>
+        </p:spPr>
+        <p:style>
+          <a:lnRef idx="2">
+            <a:schemeClr val="accent1">
+              <a:shade val="15000"/>
+            </a:schemeClr>
+          </a:lnRef>
+          <a:fillRef idx="1">
+            <a:schemeClr val="accent1"/>
+          </a:fillRef>
+          <a:effectRef idx="0">
+            <a:schemeClr val="accent1"/>
+          </a:effectRef>
+          <a:fontRef idx="minor">
+            <a:schemeClr val="lt1"/>
+          </a:fontRef>
+        </p:style>
+        <p:txBody>
+          <a:bodyPr rtlCol="0" anchor="ctr"/>
+          <a:lstStyle/>
+          <a:p>
+            <a:pPr algn="ctr"/>
+            <a:endParaRPr lang="en-SG"/>
+          </a:p>
+        </p:txBody>
+      </p:sp>
+      <p:sp>
+        <p:nvSpPr>
+          <p:cNvPr id="69" name="Oval 68">
+            <a:extLst>
+              <a:ext uri="{FF2B5EF4-FFF2-40B4-BE49-F238E27FC236}">
+                <a16:creationId xmlns:a16="http://schemas.microsoft.com/office/drawing/2014/main" id="{280A0CF7-7F68-1409-60AD-2E2B7D712A5C}"/>
+              </a:ext>
+            </a:extLst>
+          </p:cNvPr>
+          <p:cNvSpPr/>
+          <p:nvPr/>
+        </p:nvSpPr>
+        <p:spPr>
+          <a:xfrm>
+            <a:off x="8198863" y="2453483"/>
+            <a:ext cx="62346" cy="86009"/>
+          </a:xfrm>
+          <a:prstGeom prst="ellipse">
+            <a:avLst/>
+          </a:prstGeom>
+        </p:spPr>
+        <p:style>
+          <a:lnRef idx="2">
+            <a:schemeClr val="accent1">
+              <a:shade val="15000"/>
+            </a:schemeClr>
+          </a:lnRef>
+          <a:fillRef idx="1">
+            <a:schemeClr val="accent1"/>
+          </a:fillRef>
+          <a:effectRef idx="0">
+            <a:schemeClr val="accent1"/>
+          </a:effectRef>
+          <a:fontRef idx="minor">
+            <a:schemeClr val="lt1"/>
+          </a:fontRef>
+        </p:style>
+        <p:txBody>
+          <a:bodyPr rtlCol="0" anchor="ctr"/>
+          <a:lstStyle/>
+          <a:p>
+            <a:pPr algn="ctr"/>
+            <a:endParaRPr lang="en-SG"/>
+          </a:p>
+        </p:txBody>
+      </p:sp>
+      <p:sp>
+        <p:nvSpPr>
+          <p:cNvPr id="70" name="Oval 69">
+            <a:extLst>
+              <a:ext uri="{FF2B5EF4-FFF2-40B4-BE49-F238E27FC236}">
+                <a16:creationId xmlns:a16="http://schemas.microsoft.com/office/drawing/2014/main" id="{93BAB496-0BC4-CD62-30C0-BAFB00EC5A07}"/>
+              </a:ext>
+            </a:extLst>
+          </p:cNvPr>
+          <p:cNvSpPr/>
+          <p:nvPr/>
+        </p:nvSpPr>
+        <p:spPr>
+          <a:xfrm>
+            <a:off x="8756105" y="2252824"/>
+            <a:ext cx="62346" cy="86009"/>
+          </a:xfrm>
+          <a:prstGeom prst="ellipse">
+            <a:avLst/>
+          </a:prstGeom>
+        </p:spPr>
+        <p:style>
+          <a:lnRef idx="2">
+            <a:schemeClr val="accent1">
+              <a:shade val="15000"/>
+            </a:schemeClr>
+          </a:lnRef>
+          <a:fillRef idx="1">
+            <a:schemeClr val="accent1"/>
+          </a:fillRef>
+          <a:effectRef idx="0">
+            <a:schemeClr val="accent1"/>
+          </a:effectRef>
+          <a:fontRef idx="minor">
+            <a:schemeClr val="lt1"/>
+          </a:fontRef>
+        </p:style>
+        <p:txBody>
+          <a:bodyPr rtlCol="0" anchor="ctr"/>
+          <a:lstStyle/>
+          <a:p>
+            <a:pPr algn="ctr"/>
+            <a:endParaRPr lang="en-SG"/>
+          </a:p>
+        </p:txBody>
+      </p:sp>
+      <p:sp>
+        <p:nvSpPr>
+          <p:cNvPr id="71" name="Oval 70">
+            <a:extLst>
+              <a:ext uri="{FF2B5EF4-FFF2-40B4-BE49-F238E27FC236}">
+                <a16:creationId xmlns:a16="http://schemas.microsoft.com/office/drawing/2014/main" id="{36F0F1B6-5767-3296-394E-C00188344BC1}"/>
+              </a:ext>
+            </a:extLst>
+          </p:cNvPr>
+          <p:cNvSpPr/>
+          <p:nvPr/>
+        </p:nvSpPr>
+        <p:spPr>
+          <a:xfrm>
+            <a:off x="10450677" y="2433512"/>
+            <a:ext cx="62346" cy="86009"/>
+          </a:xfrm>
+          <a:prstGeom prst="ellipse">
+            <a:avLst/>
+          </a:prstGeom>
+        </p:spPr>
+        <p:style>
+          <a:lnRef idx="2">
+            <a:schemeClr val="accent1">
+              <a:shade val="15000"/>
+            </a:schemeClr>
+          </a:lnRef>
+          <a:fillRef idx="1">
+            <a:schemeClr val="accent1"/>
+          </a:fillRef>
+          <a:effectRef idx="0">
+            <a:schemeClr val="accent1"/>
+          </a:effectRef>
+          <a:fontRef idx="minor">
+            <a:schemeClr val="lt1"/>
+          </a:fontRef>
+        </p:style>
+        <p:txBody>
+          <a:bodyPr rtlCol="0" anchor="ctr"/>
+          <a:lstStyle/>
+          <a:p>
+            <a:pPr algn="ctr"/>
+            <a:endParaRPr lang="en-SG"/>
+          </a:p>
+        </p:txBody>
+      </p:sp>
+      <p:sp>
+        <p:nvSpPr>
+          <p:cNvPr id="72" name="Oval 71">
+            <a:extLst>
+              <a:ext uri="{FF2B5EF4-FFF2-40B4-BE49-F238E27FC236}">
+                <a16:creationId xmlns:a16="http://schemas.microsoft.com/office/drawing/2014/main" id="{2DEFE202-9C53-5702-37F5-CFA7BC24FB8A}"/>
+              </a:ext>
+            </a:extLst>
+          </p:cNvPr>
+          <p:cNvSpPr/>
+          <p:nvPr/>
+        </p:nvSpPr>
+        <p:spPr>
+          <a:xfrm>
+            <a:off x="11115385" y="2056911"/>
+            <a:ext cx="62346" cy="86009"/>
+          </a:xfrm>
+          <a:prstGeom prst="ellipse">
+            <a:avLst/>
+          </a:prstGeom>
+        </p:spPr>
+        <p:style>
+          <a:lnRef idx="2">
+            <a:schemeClr val="accent1">
+              <a:shade val="15000"/>
+            </a:schemeClr>
+          </a:lnRef>
+          <a:fillRef idx="1">
+            <a:schemeClr val="accent1"/>
+          </a:fillRef>
+          <a:effectRef idx="0">
+            <a:schemeClr val="accent1"/>
+          </a:effectRef>
+          <a:fontRef idx="minor">
+            <a:schemeClr val="lt1"/>
+          </a:fontRef>
+        </p:style>
+        <p:txBody>
+          <a:bodyPr rtlCol="0" anchor="ctr"/>
+          <a:lstStyle/>
+          <a:p>
+            <a:pPr algn="ctr"/>
+            <a:endParaRPr lang="en-SG"/>
+          </a:p>
+        </p:txBody>
+      </p:sp>
+      <p:sp>
+        <p:nvSpPr>
+          <p:cNvPr id="73" name="Oval 72">
+            <a:extLst>
+              <a:ext uri="{FF2B5EF4-FFF2-40B4-BE49-F238E27FC236}">
+                <a16:creationId xmlns:a16="http://schemas.microsoft.com/office/drawing/2014/main" id="{2773BBD3-200E-FB03-9E72-8FF5DA01D674}"/>
+              </a:ext>
+            </a:extLst>
+          </p:cNvPr>
+          <p:cNvSpPr/>
+          <p:nvPr/>
+        </p:nvSpPr>
+        <p:spPr>
+          <a:xfrm>
+            <a:off x="7020177" y="3753202"/>
+            <a:ext cx="62346" cy="86009"/>
+          </a:xfrm>
+          <a:prstGeom prst="ellipse">
+            <a:avLst/>
+          </a:prstGeom>
+        </p:spPr>
+        <p:style>
+          <a:lnRef idx="2">
+            <a:schemeClr val="accent1">
+              <a:shade val="15000"/>
+            </a:schemeClr>
+          </a:lnRef>
+          <a:fillRef idx="1">
+            <a:schemeClr val="accent1"/>
+          </a:fillRef>
+          <a:effectRef idx="0">
+            <a:schemeClr val="accent1"/>
+          </a:effectRef>
+          <a:fontRef idx="minor">
+            <a:schemeClr val="lt1"/>
+          </a:fontRef>
+        </p:style>
+        <p:txBody>
+          <a:bodyPr rtlCol="0" anchor="ctr"/>
+          <a:lstStyle/>
+          <a:p>
+            <a:pPr algn="ctr"/>
+            <a:endParaRPr lang="en-SG"/>
+          </a:p>
+        </p:txBody>
+      </p:sp>
+      <p:pic>
+        <p:nvPicPr>
+          <p:cNvPr id="78" name="Picture 77">
+            <a:extLst>
+              <a:ext uri="{FF2B5EF4-FFF2-40B4-BE49-F238E27FC236}">
+                <a16:creationId xmlns:a16="http://schemas.microsoft.com/office/drawing/2014/main" id="{DC3C2F11-982E-14B4-4D2E-75A888F57037}"/>
+              </a:ext>
+            </a:extLst>
+          </p:cNvPr>
+          <p:cNvPicPr>
+            <a:picLocks noChangeAspect="1"/>
+          </p:cNvPicPr>
+          <p:nvPr/>
+        </p:nvPicPr>
+        <p:blipFill>
+          <a:blip r:embed="rId8">
+            <a:extLst>
+              <a:ext uri="{28A0092B-C50C-407E-A947-70E740481C1C}">
+                <a14:useLocalDpi xmlns:a14="http://schemas.microsoft.com/office/drawing/2010/main" val="0"/>
+              </a:ext>
+            </a:extLst>
+          </a:blip>
+          <a:stretch>
+            <a:fillRect/>
+          </a:stretch>
+        </p:blipFill>
+        <p:spPr>
+          <a:xfrm rot="5400000">
+            <a:off x="6785932" y="3185872"/>
+            <a:ext cx="476190" cy="428571"/>
+          </a:xfrm>
+          <a:prstGeom prst="rect">
+            <a:avLst/>
+          </a:prstGeom>
+        </p:spPr>
+      </p:pic>
+      <p:cxnSp>
+        <p:nvCxnSpPr>
+          <p:cNvPr id="80" name="Straight Connector 79">
+            <a:extLst>
+              <a:ext uri="{FF2B5EF4-FFF2-40B4-BE49-F238E27FC236}">
+                <a16:creationId xmlns:a16="http://schemas.microsoft.com/office/drawing/2014/main" id="{EF72AE72-34E5-8524-7392-15C253FC72E6}"/>
+              </a:ext>
+            </a:extLst>
+          </p:cNvPr>
+          <p:cNvCxnSpPr>
+            <a:cxnSpLocks/>
+          </p:cNvCxnSpPr>
+          <p:nvPr/>
+        </p:nvCxnSpPr>
+        <p:spPr>
+          <a:xfrm flipH="1" flipV="1">
+            <a:off x="7109907" y="3063932"/>
+            <a:ext cx="0" cy="206166"/>
+          </a:xfrm>
+          <a:prstGeom prst="line">
+            <a:avLst/>
+          </a:prstGeom>
+          <a:ln>
+            <a:solidFill>
+              <a:schemeClr val="tx1"/>
+            </a:solidFill>
+          </a:ln>
+        </p:spPr>
+        <p:style>
+          <a:lnRef idx="2">
+            <a:schemeClr val="accent1"/>
+          </a:lnRef>
+          <a:fillRef idx="0">
+            <a:schemeClr val="accent1"/>
+          </a:fillRef>
+          <a:effectRef idx="1">
+            <a:schemeClr val="accent1"/>
+          </a:effectRef>
+          <a:fontRef idx="minor">
+            <a:schemeClr val="tx1"/>
+          </a:fontRef>
+        </p:style>
+      </p:cxnSp>
+      <p:pic>
+        <p:nvPicPr>
+          <p:cNvPr id="83" name="Picture 82">
+            <a:extLst>
+              <a:ext uri="{FF2B5EF4-FFF2-40B4-BE49-F238E27FC236}">
+                <a16:creationId xmlns:a16="http://schemas.microsoft.com/office/drawing/2014/main" id="{682DE7B4-A620-CBA0-1E5F-517BF2245B1D}"/>
+              </a:ext>
+            </a:extLst>
+          </p:cNvPr>
+          <p:cNvPicPr>
+            <a:picLocks noChangeAspect="1"/>
+          </p:cNvPicPr>
+          <p:nvPr/>
+        </p:nvPicPr>
+        <p:blipFill>
+          <a:blip r:embed="rId9"/>
+          <a:stretch>
+            <a:fillRect/>
+          </a:stretch>
+        </p:blipFill>
+        <p:spPr>
+          <a:xfrm>
+            <a:off x="6207737" y="4807597"/>
+            <a:ext cx="2797777" cy="1604059"/>
+          </a:xfrm>
+          <a:prstGeom prst="rect">
+            <a:avLst/>
+          </a:prstGeom>
+        </p:spPr>
+      </p:pic>
+      <p:cxnSp>
+        <p:nvCxnSpPr>
+          <p:cNvPr id="85" name="Connector: Elbow 84">
+            <a:extLst>
+              <a:ext uri="{FF2B5EF4-FFF2-40B4-BE49-F238E27FC236}">
+                <a16:creationId xmlns:a16="http://schemas.microsoft.com/office/drawing/2014/main" id="{E6D1A16F-D277-DBC3-C441-B573E9360743}"/>
+              </a:ext>
+            </a:extLst>
+          </p:cNvPr>
+          <p:cNvCxnSpPr>
+            <a:cxnSpLocks/>
+            <a:endCxn id="83" idx="1"/>
+          </p:cNvCxnSpPr>
+          <p:nvPr/>
+        </p:nvCxnSpPr>
+        <p:spPr>
+          <a:xfrm rot="5400000">
+            <a:off x="5356316" y="4013484"/>
+            <a:ext cx="2447565" cy="744721"/>
+          </a:xfrm>
+          <a:prstGeom prst="bentConnector4">
+            <a:avLst>
+              <a:gd name="adj1" fmla="val -820"/>
+              <a:gd name="adj2" fmla="val 130696"/>
+            </a:avLst>
+          </a:prstGeom>
+        </p:spPr>
+        <p:style>
+          <a:lnRef idx="2">
+            <a:schemeClr val="accent1"/>
+          </a:lnRef>
+          <a:fillRef idx="0">
+            <a:schemeClr val="accent1"/>
+          </a:fillRef>
+          <a:effectRef idx="1">
+            <a:schemeClr val="accent1"/>
+          </a:effectRef>
+          <a:fontRef idx="minor">
+            <a:schemeClr val="tx1"/>
+          </a:fontRef>
+        </p:style>
+      </p:cxnSp>
+      <p:pic>
+        <p:nvPicPr>
+          <p:cNvPr id="88" name="Graphic 87" descr="Construction worker male with solid fill">
+            <a:extLst>
+              <a:ext uri="{FF2B5EF4-FFF2-40B4-BE49-F238E27FC236}">
+                <a16:creationId xmlns:a16="http://schemas.microsoft.com/office/drawing/2014/main" id="{84BEB41A-BD40-70EF-AAE9-3E4591493B75}"/>
+              </a:ext>
+            </a:extLst>
+          </p:cNvPr>
+          <p:cNvPicPr>
+            <a:picLocks noChangeAspect="1"/>
+          </p:cNvPicPr>
+          <p:nvPr/>
+        </p:nvPicPr>
+        <p:blipFill>
+          <a:blip r:embed="rId10">
+            <a:extLst>
+              <a:ext uri="{96DAC541-7B7A-43D3-8B79-37D633B846F1}">
+                <asvg:svgBlip xmlns:asvg="http://schemas.microsoft.com/office/drawing/2016/SVG/main" r:embed="rId11"/>
+              </a:ext>
+            </a:extLst>
+          </a:blip>
+          <a:stretch>
+            <a:fillRect/>
+          </a:stretch>
+        </p:blipFill>
+        <p:spPr>
+          <a:xfrm>
+            <a:off x="9630729" y="5033173"/>
+            <a:ext cx="1152907" cy="1152907"/>
+          </a:xfrm>
+          <a:prstGeom prst="rect">
+            <a:avLst/>
+          </a:prstGeom>
+        </p:spPr>
+      </p:pic>
+      <p:sp>
+        <p:nvSpPr>
+          <p:cNvPr id="96" name="Arrow: Right 95">
+            <a:extLst>
+              <a:ext uri="{FF2B5EF4-FFF2-40B4-BE49-F238E27FC236}">
+                <a16:creationId xmlns:a16="http://schemas.microsoft.com/office/drawing/2014/main" id="{C384DFDA-BA85-BFD4-1B90-9E6B74B06CBF}"/>
+              </a:ext>
+            </a:extLst>
+          </p:cNvPr>
+          <p:cNvSpPr/>
+          <p:nvPr/>
+        </p:nvSpPr>
+        <p:spPr>
+          <a:xfrm>
+            <a:off x="5756744" y="2161279"/>
+            <a:ext cx="744721" cy="396571"/>
+          </a:xfrm>
+          <a:prstGeom prst="rightArrow">
+            <a:avLst/>
+          </a:prstGeom>
+        </p:spPr>
+        <p:style>
+          <a:lnRef idx="2">
+            <a:schemeClr val="accent6">
+              <a:shade val="15000"/>
+            </a:schemeClr>
+          </a:lnRef>
+          <a:fillRef idx="1">
+            <a:schemeClr val="accent6"/>
+          </a:fillRef>
+          <a:effectRef idx="0">
+            <a:schemeClr val="accent6"/>
+          </a:effectRef>
+          <a:fontRef idx="minor">
+            <a:schemeClr val="lt1"/>
+          </a:fontRef>
+        </p:style>
+        <p:txBody>
+          <a:bodyPr rtlCol="0" anchor="ctr"/>
+          <a:lstStyle/>
+          <a:p>
+            <a:pPr algn="ctr"/>
+            <a:endParaRPr lang="en-SG"/>
+          </a:p>
+        </p:txBody>
+      </p:sp>
+      <p:sp>
+        <p:nvSpPr>
+          <p:cNvPr id="97" name="TextBox 96">
+            <a:extLst>
+              <a:ext uri="{FF2B5EF4-FFF2-40B4-BE49-F238E27FC236}">
+                <a16:creationId xmlns:a16="http://schemas.microsoft.com/office/drawing/2014/main" id="{5CA2CA92-9F0C-050F-C657-CC82491C7A75}"/>
+              </a:ext>
+            </a:extLst>
+          </p:cNvPr>
+          <p:cNvSpPr txBox="1"/>
+          <p:nvPr/>
+        </p:nvSpPr>
+        <p:spPr>
+          <a:xfrm>
+            <a:off x="1619560" y="534618"/>
+            <a:ext cx="4088764" cy="584775"/>
+          </a:xfrm>
+          <a:prstGeom prst="rect">
+            <a:avLst/>
+          </a:prstGeom>
+          <a:noFill/>
+        </p:spPr>
+        <p:txBody>
+          <a:bodyPr wrap="square" rtlCol="0">
+            <a:spAutoFit/>
+          </a:bodyPr>
+          <a:lstStyle/>
+          <a:p>
+            <a:r>
+              <a:rPr lang="en-US" sz="1600" b="1" dirty="0">
+                <a:solidFill>
+                  <a:srgbClr val="C00000"/>
+                </a:solidFill>
+              </a:rPr>
+              <a:t>Track Block Controller Circuit Diagram without ATC override function</a:t>
+            </a:r>
+            <a:endParaRPr lang="en-SG" sz="1600" b="1" dirty="0">
+              <a:solidFill>
+                <a:srgbClr val="C00000"/>
+              </a:solidFill>
+            </a:endParaRPr>
+          </a:p>
+        </p:txBody>
+      </p:sp>
+      <p:sp>
+        <p:nvSpPr>
+          <p:cNvPr id="98" name="TextBox 97">
+            <a:extLst>
+              <a:ext uri="{FF2B5EF4-FFF2-40B4-BE49-F238E27FC236}">
+                <a16:creationId xmlns:a16="http://schemas.microsoft.com/office/drawing/2014/main" id="{7C59658D-1573-F574-E568-759A5164774B}"/>
+              </a:ext>
+            </a:extLst>
+          </p:cNvPr>
+          <p:cNvSpPr txBox="1"/>
+          <p:nvPr/>
+        </p:nvSpPr>
+        <p:spPr>
+          <a:xfrm>
+            <a:off x="7693007" y="528908"/>
+            <a:ext cx="3931472" cy="584775"/>
+          </a:xfrm>
+          <a:prstGeom prst="rect">
+            <a:avLst/>
+          </a:prstGeom>
+          <a:noFill/>
+        </p:spPr>
+        <p:txBody>
+          <a:bodyPr wrap="square" rtlCol="0">
+            <a:spAutoFit/>
+          </a:bodyPr>
+          <a:lstStyle/>
+          <a:p>
+            <a:r>
+              <a:rPr lang="en-US" sz="1600" b="1" dirty="0">
+                <a:solidFill>
+                  <a:schemeClr val="accent6">
+                    <a:lumMod val="75000"/>
+                  </a:schemeClr>
+                </a:solidFill>
+              </a:rPr>
+              <a:t>Track Block Controller Circuit Diagram with ATC override function</a:t>
+            </a:r>
+            <a:endParaRPr lang="en-SG" sz="1600" b="1" dirty="0">
+              <a:solidFill>
+                <a:schemeClr val="accent6">
+                  <a:lumMod val="75000"/>
+                </a:schemeClr>
+              </a:solidFill>
+            </a:endParaRPr>
+          </a:p>
+        </p:txBody>
+      </p:sp>
+      <p:pic>
+        <p:nvPicPr>
+          <p:cNvPr id="126" name="Picture 125">
+            <a:extLst>
+              <a:ext uri="{FF2B5EF4-FFF2-40B4-BE49-F238E27FC236}">
+                <a16:creationId xmlns:a16="http://schemas.microsoft.com/office/drawing/2014/main" id="{B9B229FD-0ABF-BFEC-74B3-0B0EB64BFB15}"/>
+              </a:ext>
+            </a:extLst>
+          </p:cNvPr>
+          <p:cNvPicPr>
+            <a:picLocks noChangeAspect="1"/>
+          </p:cNvPicPr>
+          <p:nvPr/>
+        </p:nvPicPr>
+        <p:blipFill>
+          <a:blip r:embed="rId12"/>
+          <a:stretch>
+            <a:fillRect/>
+          </a:stretch>
+        </p:blipFill>
+        <p:spPr>
+          <a:xfrm>
+            <a:off x="1619560" y="4825956"/>
+            <a:ext cx="3811181" cy="1542621"/>
+          </a:xfrm>
+          <a:prstGeom prst="rect">
+            <a:avLst/>
+          </a:prstGeom>
+          <a:ln w="6350">
+            <a:solidFill>
+              <a:schemeClr val="tx1"/>
+            </a:solidFill>
+          </a:ln>
+        </p:spPr>
+      </p:pic>
+      <p:sp>
+        <p:nvSpPr>
+          <p:cNvPr id="127" name="TextBox 126">
+            <a:extLst>
+              <a:ext uri="{FF2B5EF4-FFF2-40B4-BE49-F238E27FC236}">
+                <a16:creationId xmlns:a16="http://schemas.microsoft.com/office/drawing/2014/main" id="{41FB5783-B33B-67A2-BDBE-AACCC0AE7FF9}"/>
+              </a:ext>
+            </a:extLst>
+          </p:cNvPr>
+          <p:cNvSpPr txBox="1"/>
+          <p:nvPr/>
+        </p:nvSpPr>
+        <p:spPr>
+          <a:xfrm>
+            <a:off x="1036508" y="4586308"/>
+            <a:ext cx="4885372" cy="276999"/>
+          </a:xfrm>
+          <a:prstGeom prst="rect">
+            <a:avLst/>
+          </a:prstGeom>
+          <a:noFill/>
+        </p:spPr>
+        <p:txBody>
+          <a:bodyPr wrap="square" rtlCol="0">
+            <a:spAutoFit/>
+          </a:bodyPr>
+          <a:lstStyle/>
+          <a:p>
+            <a:r>
+              <a:rPr lang="en-US" sz="1200" b="1" dirty="0">
+                <a:solidFill>
+                  <a:schemeClr val="accent6">
+                    <a:lumMod val="75000"/>
+                  </a:schemeClr>
+                </a:solidFill>
+              </a:rPr>
+              <a:t>Track Block Controller Ladder Diagram with ATC override function</a:t>
+            </a:r>
+            <a:endParaRPr lang="en-SG" sz="1200" b="1" dirty="0">
+              <a:solidFill>
+                <a:schemeClr val="accent6">
+                  <a:lumMod val="75000"/>
+                </a:schemeClr>
+              </a:solidFill>
+            </a:endParaRPr>
+          </a:p>
+        </p:txBody>
+      </p:sp>
+      <p:sp>
+        <p:nvSpPr>
+          <p:cNvPr id="128" name="TextBox 127">
+            <a:extLst>
+              <a:ext uri="{FF2B5EF4-FFF2-40B4-BE49-F238E27FC236}">
+                <a16:creationId xmlns:a16="http://schemas.microsoft.com/office/drawing/2014/main" id="{E1F26016-E657-0899-9705-D9E3E49D594E}"/>
+              </a:ext>
+            </a:extLst>
+          </p:cNvPr>
+          <p:cNvSpPr txBox="1"/>
+          <p:nvPr/>
+        </p:nvSpPr>
+        <p:spPr>
+          <a:xfrm>
+            <a:off x="6205432" y="4489089"/>
+            <a:ext cx="2461636" cy="276999"/>
+          </a:xfrm>
+          <a:prstGeom prst="rect">
+            <a:avLst/>
+          </a:prstGeom>
+          <a:noFill/>
+        </p:spPr>
+        <p:txBody>
+          <a:bodyPr wrap="square" rtlCol="0">
+            <a:spAutoFit/>
+          </a:bodyPr>
+          <a:lstStyle/>
+          <a:p>
+            <a:r>
+              <a:rPr lang="en-US" sz="1200" b="1" dirty="0">
+                <a:solidFill>
+                  <a:schemeClr val="accent6">
+                    <a:lumMod val="75000"/>
+                  </a:schemeClr>
+                </a:solidFill>
+              </a:rPr>
+              <a:t>Track Block HQ Control HMI</a:t>
+            </a:r>
+            <a:endParaRPr lang="en-SG" sz="1200" b="1" dirty="0">
+              <a:solidFill>
+                <a:schemeClr val="accent6">
+                  <a:lumMod val="75000"/>
+                </a:schemeClr>
+              </a:solidFill>
+            </a:endParaRPr>
+          </a:p>
+        </p:txBody>
+      </p:sp>
+      <p:sp>
+        <p:nvSpPr>
+          <p:cNvPr id="129" name="Arrow: Right 128">
+            <a:extLst>
+              <a:ext uri="{FF2B5EF4-FFF2-40B4-BE49-F238E27FC236}">
+                <a16:creationId xmlns:a16="http://schemas.microsoft.com/office/drawing/2014/main" id="{AEB6EB6D-E34F-2BF3-320E-FD22D47C5D66}"/>
+              </a:ext>
+            </a:extLst>
+          </p:cNvPr>
+          <p:cNvSpPr/>
+          <p:nvPr/>
+        </p:nvSpPr>
+        <p:spPr>
+          <a:xfrm rot="10800000">
+            <a:off x="9082284" y="5464727"/>
+            <a:ext cx="564369" cy="307920"/>
+          </a:xfrm>
+          <a:prstGeom prst="rightArrow">
+            <a:avLst/>
+          </a:prstGeom>
+        </p:spPr>
+        <p:style>
+          <a:lnRef idx="2">
+            <a:schemeClr val="accent6">
+              <a:shade val="15000"/>
+            </a:schemeClr>
+          </a:lnRef>
+          <a:fillRef idx="1">
+            <a:schemeClr val="accent6"/>
+          </a:fillRef>
+          <a:effectRef idx="0">
+            <a:schemeClr val="accent6"/>
+          </a:effectRef>
+          <a:fontRef idx="minor">
+            <a:schemeClr val="lt1"/>
+          </a:fontRef>
+        </p:style>
+        <p:txBody>
+          <a:bodyPr rtlCol="0" anchor="ctr"/>
+          <a:lstStyle/>
+          <a:p>
+            <a:pPr algn="ctr"/>
+            <a:endParaRPr lang="en-SG"/>
+          </a:p>
+        </p:txBody>
+      </p:sp>
+      <p:sp>
+        <p:nvSpPr>
+          <p:cNvPr id="130" name="TextBox 129">
+            <a:extLst>
+              <a:ext uri="{FF2B5EF4-FFF2-40B4-BE49-F238E27FC236}">
+                <a16:creationId xmlns:a16="http://schemas.microsoft.com/office/drawing/2014/main" id="{635351A6-3B30-6BE0-E7FC-057A0B70E34D}"/>
+              </a:ext>
+            </a:extLst>
+          </p:cNvPr>
+          <p:cNvSpPr txBox="1"/>
+          <p:nvPr/>
+        </p:nvSpPr>
+        <p:spPr>
+          <a:xfrm>
+            <a:off x="9364468" y="4687456"/>
+            <a:ext cx="2461636" cy="276999"/>
+          </a:xfrm>
+          <a:prstGeom prst="rect">
+            <a:avLst/>
+          </a:prstGeom>
+          <a:noFill/>
+        </p:spPr>
+        <p:txBody>
+          <a:bodyPr wrap="square" rtlCol="0">
+            <a:spAutoFit/>
+          </a:bodyPr>
+          <a:lstStyle/>
+          <a:p>
+            <a:r>
+              <a:rPr lang="en-US" sz="1200" b="1" dirty="0">
+                <a:solidFill>
+                  <a:schemeClr val="tx2">
+                    <a:lumMod val="75000"/>
+                    <a:lumOff val="25000"/>
+                  </a:schemeClr>
+                </a:solidFill>
+              </a:rPr>
+              <a:t>Railway HQ Operator </a:t>
+            </a:r>
+            <a:endParaRPr lang="en-SG" sz="1200" b="1" dirty="0">
+              <a:solidFill>
+                <a:schemeClr val="tx2">
+                  <a:lumMod val="75000"/>
+                  <a:lumOff val="25000"/>
+                </a:schemeClr>
+              </a:solidFill>
+            </a:endParaRPr>
+          </a:p>
+        </p:txBody>
+      </p:sp>
+      <p:sp>
+        <p:nvSpPr>
+          <p:cNvPr id="131" name="Oval 130">
+            <a:extLst>
+              <a:ext uri="{FF2B5EF4-FFF2-40B4-BE49-F238E27FC236}">
+                <a16:creationId xmlns:a16="http://schemas.microsoft.com/office/drawing/2014/main" id="{367650CB-18D9-1D2C-C5AD-0398BDDF8C30}"/>
+              </a:ext>
+            </a:extLst>
+          </p:cNvPr>
+          <p:cNvSpPr/>
+          <p:nvPr/>
+        </p:nvSpPr>
+        <p:spPr>
+          <a:xfrm>
+            <a:off x="6272664" y="2603256"/>
+            <a:ext cx="1440539" cy="1495119"/>
+          </a:xfrm>
+          <a:prstGeom prst="ellipse">
+            <a:avLst/>
+          </a:prstGeom>
+          <a:noFill/>
+          <a:ln>
+            <a:solidFill>
+              <a:srgbClr val="FF0000"/>
+            </a:solidFill>
+            <a:prstDash val="sysDash"/>
+          </a:ln>
+        </p:spPr>
+        <p:style>
+          <a:lnRef idx="2">
+            <a:schemeClr val="accent1">
+              <a:shade val="15000"/>
+            </a:schemeClr>
+          </a:lnRef>
+          <a:fillRef idx="1">
+            <a:schemeClr val="accent1"/>
+          </a:fillRef>
+          <a:effectRef idx="0">
+            <a:schemeClr val="accent1"/>
+          </a:effectRef>
+          <a:fontRef idx="minor">
+            <a:schemeClr val="lt1"/>
+          </a:fontRef>
+        </p:style>
+        <p:txBody>
+          <a:bodyPr rtlCol="0" anchor="ctr"/>
+          <a:lstStyle/>
+          <a:p>
+            <a:pPr algn="ctr"/>
+            <a:endParaRPr lang="en-SG" dirty="0"/>
+          </a:p>
+        </p:txBody>
+      </p:sp>
+    </p:spTree>
+    <p:extLst>
+      <p:ext uri="{BB962C8B-B14F-4D97-AF65-F5344CB8AC3E}">
+        <p14:creationId xmlns:p14="http://schemas.microsoft.com/office/powerpoint/2010/main" val="3644548832"/>
+      </p:ext>
+    </p:extLst>
+  </p:cSld>
+  <p:clrMapOvr>
+    <a:masterClrMapping/>
+  </p:clrMapOvr>
+</p:sld>
+</file>
+
 <file path=ppt/slides/slide2.xml><?xml version="1.0" encoding="utf-8"?>
 <p:sld xmlns:a="http://schemas.openxmlformats.org/drawingml/2006/main" xmlns:r="http://schemas.openxmlformats.org/officeDocument/2006/relationships" xmlns:p="http://schemas.openxmlformats.org/presentationml/2006/main">
   <p:cSld>
@@ -11922,6 +15609,1088 @@
           </a:prstGeom>
         </p:spPr>
       </p:pic>
+      <p:pic>
+        <p:nvPicPr>
+          <p:cNvPr id="2" name="Picture 1">
+            <a:extLst>
+              <a:ext uri="{FF2B5EF4-FFF2-40B4-BE49-F238E27FC236}">
+                <a16:creationId xmlns:a16="http://schemas.microsoft.com/office/drawing/2014/main" id="{7E37034A-510B-2AB6-C278-D2DB3CB5D25E}"/>
+              </a:ext>
+            </a:extLst>
+          </p:cNvPr>
+          <p:cNvPicPr>
+            <a:picLocks noChangeAspect="1"/>
+          </p:cNvPicPr>
+          <p:nvPr/>
+        </p:nvPicPr>
+        <p:blipFill>
+          <a:blip r:embed="rId3">
+            <a:extLst>
+              <a:ext uri="{28A0092B-C50C-407E-A947-70E740481C1C}">
+                <a14:useLocalDpi xmlns:a14="http://schemas.microsoft.com/office/drawing/2010/main" val="0"/>
+              </a:ext>
+            </a:extLst>
+          </a:blip>
+          <a:stretch>
+            <a:fillRect/>
+          </a:stretch>
+        </p:blipFill>
+        <p:spPr>
+          <a:xfrm>
+            <a:off x="5223488" y="4967519"/>
+            <a:ext cx="409524" cy="323810"/>
+          </a:xfrm>
+          <a:prstGeom prst="rect">
+            <a:avLst/>
+          </a:prstGeom>
+        </p:spPr>
+      </p:pic>
+      <p:pic>
+        <p:nvPicPr>
+          <p:cNvPr id="3" name="Picture 2">
+            <a:extLst>
+              <a:ext uri="{FF2B5EF4-FFF2-40B4-BE49-F238E27FC236}">
+                <a16:creationId xmlns:a16="http://schemas.microsoft.com/office/drawing/2014/main" id="{BBDB5E82-EBA3-12BF-9D67-3EE0FF722CE7}"/>
+              </a:ext>
+            </a:extLst>
+          </p:cNvPr>
+          <p:cNvPicPr>
+            <a:picLocks noChangeAspect="1"/>
+          </p:cNvPicPr>
+          <p:nvPr/>
+        </p:nvPicPr>
+        <p:blipFill>
+          <a:blip r:embed="rId3">
+            <a:extLst>
+              <a:ext uri="{28A0092B-C50C-407E-A947-70E740481C1C}">
+                <a14:useLocalDpi xmlns:a14="http://schemas.microsoft.com/office/drawing/2010/main" val="0"/>
+              </a:ext>
+            </a:extLst>
+          </a:blip>
+          <a:stretch>
+            <a:fillRect/>
+          </a:stretch>
+        </p:blipFill>
+        <p:spPr>
+          <a:xfrm>
+            <a:off x="5220033" y="5530271"/>
+            <a:ext cx="409524" cy="323810"/>
+          </a:xfrm>
+          <a:prstGeom prst="rect">
+            <a:avLst/>
+          </a:prstGeom>
+        </p:spPr>
+      </p:pic>
+      <p:cxnSp>
+        <p:nvCxnSpPr>
+          <p:cNvPr id="4" name="Straight Connector 3">
+            <a:extLst>
+              <a:ext uri="{FF2B5EF4-FFF2-40B4-BE49-F238E27FC236}">
+                <a16:creationId xmlns:a16="http://schemas.microsoft.com/office/drawing/2014/main" id="{F6C0DCC3-6D1C-01E3-2AD6-08E36D665D8D}"/>
+              </a:ext>
+            </a:extLst>
+          </p:cNvPr>
+          <p:cNvCxnSpPr>
+            <a:cxnSpLocks/>
+          </p:cNvCxnSpPr>
+          <p:nvPr/>
+        </p:nvCxnSpPr>
+        <p:spPr>
+          <a:xfrm>
+            <a:off x="5629557" y="5119254"/>
+            <a:ext cx="712686" cy="0"/>
+          </a:xfrm>
+          <a:prstGeom prst="line">
+            <a:avLst/>
+          </a:prstGeom>
+        </p:spPr>
+        <p:style>
+          <a:lnRef idx="2">
+            <a:schemeClr val="dk1"/>
+          </a:lnRef>
+          <a:fillRef idx="0">
+            <a:schemeClr val="dk1"/>
+          </a:fillRef>
+          <a:effectRef idx="1">
+            <a:schemeClr val="dk1"/>
+          </a:effectRef>
+          <a:fontRef idx="minor">
+            <a:schemeClr val="tx1"/>
+          </a:fontRef>
+        </p:style>
+      </p:cxnSp>
+      <p:cxnSp>
+        <p:nvCxnSpPr>
+          <p:cNvPr id="12" name="Connector: Elbow 11">
+            <a:extLst>
+              <a:ext uri="{FF2B5EF4-FFF2-40B4-BE49-F238E27FC236}">
+                <a16:creationId xmlns:a16="http://schemas.microsoft.com/office/drawing/2014/main" id="{F06EB8D8-FF24-C91B-07D7-67141BE4F370}"/>
+              </a:ext>
+            </a:extLst>
+          </p:cNvPr>
+          <p:cNvCxnSpPr>
+            <a:cxnSpLocks/>
+            <a:stCxn id="3" idx="3"/>
+          </p:cNvCxnSpPr>
+          <p:nvPr/>
+        </p:nvCxnSpPr>
+        <p:spPr>
+          <a:xfrm flipV="1">
+            <a:off x="5629557" y="5119254"/>
+            <a:ext cx="712686" cy="572922"/>
+          </a:xfrm>
+          <a:prstGeom prst="bentConnector3">
+            <a:avLst/>
+          </a:prstGeom>
+        </p:spPr>
+        <p:style>
+          <a:lnRef idx="2">
+            <a:schemeClr val="dk1"/>
+          </a:lnRef>
+          <a:fillRef idx="0">
+            <a:schemeClr val="dk1"/>
+          </a:fillRef>
+          <a:effectRef idx="1">
+            <a:schemeClr val="dk1"/>
+          </a:effectRef>
+          <a:fontRef idx="minor">
+            <a:schemeClr val="tx1"/>
+          </a:fontRef>
+        </p:style>
+      </p:cxnSp>
+      <p:sp>
+        <p:nvSpPr>
+          <p:cNvPr id="13" name="TextBox 12">
+            <a:extLst>
+              <a:ext uri="{FF2B5EF4-FFF2-40B4-BE49-F238E27FC236}">
+                <a16:creationId xmlns:a16="http://schemas.microsoft.com/office/drawing/2014/main" id="{71F0E15C-5629-9C7D-58A1-3E47AB0507EC}"/>
+              </a:ext>
+            </a:extLst>
+          </p:cNvPr>
+          <p:cNvSpPr txBox="1"/>
+          <p:nvPr/>
+        </p:nvSpPr>
+        <p:spPr>
+          <a:xfrm>
+            <a:off x="5218564" y="4691639"/>
+            <a:ext cx="646455" cy="261610"/>
+          </a:xfrm>
+          <a:prstGeom prst="rect">
+            <a:avLst/>
+          </a:prstGeom>
+          <a:noFill/>
+        </p:spPr>
+        <p:txBody>
+          <a:bodyPr wrap="square" rtlCol="0">
+            <a:spAutoFit/>
+          </a:bodyPr>
+          <a:lstStyle/>
+          <a:p>
+            <a:r>
+              <a:rPr lang="en-US" sz="1100" b="1" dirty="0"/>
+              <a:t>HR1</a:t>
+            </a:r>
+            <a:endParaRPr lang="en-SG" sz="1100" b="1" dirty="0"/>
+          </a:p>
+        </p:txBody>
+      </p:sp>
+      <p:sp>
+        <p:nvSpPr>
+          <p:cNvPr id="14" name="TextBox 13">
+            <a:extLst>
+              <a:ext uri="{FF2B5EF4-FFF2-40B4-BE49-F238E27FC236}">
+                <a16:creationId xmlns:a16="http://schemas.microsoft.com/office/drawing/2014/main" id="{BAF40B29-8F92-9BAE-E71B-D433EC4AFBAC}"/>
+              </a:ext>
+            </a:extLst>
+          </p:cNvPr>
+          <p:cNvSpPr txBox="1"/>
+          <p:nvPr/>
+        </p:nvSpPr>
+        <p:spPr>
+          <a:xfrm>
+            <a:off x="5190226" y="5270990"/>
+            <a:ext cx="646455" cy="261610"/>
+          </a:xfrm>
+          <a:prstGeom prst="rect">
+            <a:avLst/>
+          </a:prstGeom>
+          <a:noFill/>
+        </p:spPr>
+        <p:txBody>
+          <a:bodyPr wrap="square" rtlCol="0">
+            <a:spAutoFit/>
+          </a:bodyPr>
+          <a:lstStyle/>
+          <a:p>
+            <a:r>
+              <a:rPr lang="en-US" sz="1100" b="1" dirty="0"/>
+              <a:t>HR2</a:t>
+            </a:r>
+            <a:endParaRPr lang="en-SG" sz="1100" b="1" dirty="0"/>
+          </a:p>
+        </p:txBody>
+      </p:sp>
+      <p:sp>
+        <p:nvSpPr>
+          <p:cNvPr id="15" name="Rectangle 14">
+            <a:extLst>
+              <a:ext uri="{FF2B5EF4-FFF2-40B4-BE49-F238E27FC236}">
+                <a16:creationId xmlns:a16="http://schemas.microsoft.com/office/drawing/2014/main" id="{0E308CBF-1C93-A58D-E757-2A89B6AEFB00}"/>
+              </a:ext>
+            </a:extLst>
+          </p:cNvPr>
+          <p:cNvSpPr/>
+          <p:nvPr/>
+        </p:nvSpPr>
+        <p:spPr>
+          <a:xfrm>
+            <a:off x="7946477" y="3848952"/>
+            <a:ext cx="1129085" cy="1572447"/>
+          </a:xfrm>
+          <a:prstGeom prst="rect">
+            <a:avLst/>
+          </a:prstGeom>
+          <a:noFill/>
+        </p:spPr>
+        <p:style>
+          <a:lnRef idx="2">
+            <a:schemeClr val="accent1">
+              <a:shade val="15000"/>
+            </a:schemeClr>
+          </a:lnRef>
+          <a:fillRef idx="1">
+            <a:schemeClr val="accent1"/>
+          </a:fillRef>
+          <a:effectRef idx="0">
+            <a:schemeClr val="accent1"/>
+          </a:effectRef>
+          <a:fontRef idx="minor">
+            <a:schemeClr val="lt1"/>
+          </a:fontRef>
+        </p:style>
+        <p:txBody>
+          <a:bodyPr rtlCol="0" anchor="ctr"/>
+          <a:lstStyle/>
+          <a:p>
+            <a:pPr algn="ctr"/>
+            <a:endParaRPr lang="en-SG" dirty="0"/>
+          </a:p>
+        </p:txBody>
+      </p:sp>
+      <p:sp>
+        <p:nvSpPr>
+          <p:cNvPr id="16" name="TextBox 15">
+            <a:extLst>
+              <a:ext uri="{FF2B5EF4-FFF2-40B4-BE49-F238E27FC236}">
+                <a16:creationId xmlns:a16="http://schemas.microsoft.com/office/drawing/2014/main" id="{129CDFCA-6BB3-6908-D807-BD148D7B73F1}"/>
+              </a:ext>
+            </a:extLst>
+          </p:cNvPr>
+          <p:cNvSpPr txBox="1"/>
+          <p:nvPr/>
+        </p:nvSpPr>
+        <p:spPr>
+          <a:xfrm>
+            <a:off x="8313829" y="3874692"/>
+            <a:ext cx="462356" cy="307777"/>
+          </a:xfrm>
+          <a:prstGeom prst="rect">
+            <a:avLst/>
+          </a:prstGeom>
+          <a:noFill/>
+        </p:spPr>
+        <p:txBody>
+          <a:bodyPr wrap="square" rtlCol="0">
+            <a:spAutoFit/>
+          </a:bodyPr>
+          <a:lstStyle/>
+          <a:p>
+            <a:r>
+              <a:rPr lang="en-US" sz="1400" b="1" dirty="0"/>
+              <a:t>JK</a:t>
+            </a:r>
+            <a:endParaRPr lang="en-SG" sz="1400" b="1" dirty="0"/>
+          </a:p>
+        </p:txBody>
+      </p:sp>
+      <p:pic>
+        <p:nvPicPr>
+          <p:cNvPr id="17" name="Picture 16">
+            <a:extLst>
+              <a:ext uri="{FF2B5EF4-FFF2-40B4-BE49-F238E27FC236}">
+                <a16:creationId xmlns:a16="http://schemas.microsoft.com/office/drawing/2014/main" id="{9A4F11E5-88DA-A194-FAC8-C4C4F9FACC21}"/>
+              </a:ext>
+            </a:extLst>
+          </p:cNvPr>
+          <p:cNvPicPr>
+            <a:picLocks noChangeAspect="1"/>
+          </p:cNvPicPr>
+          <p:nvPr/>
+        </p:nvPicPr>
+        <p:blipFill>
+          <a:blip r:embed="rId3">
+            <a:extLst>
+              <a:ext uri="{28A0092B-C50C-407E-A947-70E740481C1C}">
+                <a14:useLocalDpi xmlns:a14="http://schemas.microsoft.com/office/drawing/2010/main" val="0"/>
+              </a:ext>
+            </a:extLst>
+          </a:blip>
+          <a:stretch>
+            <a:fillRect/>
+          </a:stretch>
+        </p:blipFill>
+        <p:spPr>
+          <a:xfrm>
+            <a:off x="5271034" y="3819157"/>
+            <a:ext cx="409524" cy="323810"/>
+          </a:xfrm>
+          <a:prstGeom prst="rect">
+            <a:avLst/>
+          </a:prstGeom>
+        </p:spPr>
+      </p:pic>
+      <p:sp>
+        <p:nvSpPr>
+          <p:cNvPr id="18" name="TextBox 17">
+            <a:extLst>
+              <a:ext uri="{FF2B5EF4-FFF2-40B4-BE49-F238E27FC236}">
+                <a16:creationId xmlns:a16="http://schemas.microsoft.com/office/drawing/2014/main" id="{E1BD1A28-4BA5-E917-06C3-75505520E0B8}"/>
+              </a:ext>
+            </a:extLst>
+          </p:cNvPr>
+          <p:cNvSpPr txBox="1"/>
+          <p:nvPr/>
+        </p:nvSpPr>
+        <p:spPr>
+          <a:xfrm>
+            <a:off x="5232053" y="3577285"/>
+            <a:ext cx="646455" cy="261610"/>
+          </a:xfrm>
+          <a:prstGeom prst="rect">
+            <a:avLst/>
+          </a:prstGeom>
+          <a:noFill/>
+        </p:spPr>
+        <p:txBody>
+          <a:bodyPr wrap="square" rtlCol="0">
+            <a:spAutoFit/>
+          </a:bodyPr>
+          <a:lstStyle/>
+          <a:p>
+            <a:r>
+              <a:rPr lang="en-US" sz="1100" b="1" dirty="0"/>
+              <a:t>HR1</a:t>
+            </a:r>
+            <a:endParaRPr lang="en-SG" sz="1100" b="1" dirty="0"/>
+          </a:p>
+        </p:txBody>
+      </p:sp>
+      <p:cxnSp>
+        <p:nvCxnSpPr>
+          <p:cNvPr id="19" name="Straight Connector 18">
+            <a:extLst>
+              <a:ext uri="{FF2B5EF4-FFF2-40B4-BE49-F238E27FC236}">
+                <a16:creationId xmlns:a16="http://schemas.microsoft.com/office/drawing/2014/main" id="{6626E68F-022C-0B3E-C050-553E79FA3C5D}"/>
+              </a:ext>
+            </a:extLst>
+          </p:cNvPr>
+          <p:cNvCxnSpPr>
+            <a:cxnSpLocks/>
+          </p:cNvCxnSpPr>
+          <p:nvPr/>
+        </p:nvCxnSpPr>
+        <p:spPr>
+          <a:xfrm>
+            <a:off x="5659472" y="3975805"/>
+            <a:ext cx="2265919" cy="9568"/>
+          </a:xfrm>
+          <a:prstGeom prst="line">
+            <a:avLst/>
+          </a:prstGeom>
+        </p:spPr>
+        <p:style>
+          <a:lnRef idx="2">
+            <a:schemeClr val="dk1"/>
+          </a:lnRef>
+          <a:fillRef idx="0">
+            <a:schemeClr val="dk1"/>
+          </a:fillRef>
+          <a:effectRef idx="1">
+            <a:schemeClr val="dk1"/>
+          </a:effectRef>
+          <a:fontRef idx="minor">
+            <a:schemeClr val="tx1"/>
+          </a:fontRef>
+        </p:style>
+      </p:cxnSp>
+      <p:sp>
+        <p:nvSpPr>
+          <p:cNvPr id="22" name="TextBox 21">
+            <a:extLst>
+              <a:ext uri="{FF2B5EF4-FFF2-40B4-BE49-F238E27FC236}">
+                <a16:creationId xmlns:a16="http://schemas.microsoft.com/office/drawing/2014/main" id="{5B61B794-41F7-24C4-C9EE-350417481AAE}"/>
+              </a:ext>
+            </a:extLst>
+          </p:cNvPr>
+          <p:cNvSpPr txBox="1"/>
+          <p:nvPr/>
+        </p:nvSpPr>
+        <p:spPr>
+          <a:xfrm>
+            <a:off x="7963849" y="3881357"/>
+            <a:ext cx="294053" cy="261610"/>
+          </a:xfrm>
+          <a:prstGeom prst="rect">
+            <a:avLst/>
+          </a:prstGeom>
+          <a:noFill/>
+        </p:spPr>
+        <p:txBody>
+          <a:bodyPr wrap="square" rtlCol="0">
+            <a:spAutoFit/>
+          </a:bodyPr>
+          <a:lstStyle/>
+          <a:p>
+            <a:r>
+              <a:rPr lang="en-US" sz="1100" b="1" dirty="0"/>
+              <a:t>J</a:t>
+            </a:r>
+            <a:endParaRPr lang="en-SG" sz="1100" b="1" dirty="0"/>
+          </a:p>
+        </p:txBody>
+      </p:sp>
+      <p:pic>
+        <p:nvPicPr>
+          <p:cNvPr id="23" name="Picture 22">
+            <a:extLst>
+              <a:ext uri="{FF2B5EF4-FFF2-40B4-BE49-F238E27FC236}">
+                <a16:creationId xmlns:a16="http://schemas.microsoft.com/office/drawing/2014/main" id="{1F7242ED-1299-7A7B-47D1-B30BDC23878E}"/>
+              </a:ext>
+            </a:extLst>
+          </p:cNvPr>
+          <p:cNvPicPr>
+            <a:picLocks noChangeAspect="1"/>
+          </p:cNvPicPr>
+          <p:nvPr/>
+        </p:nvPicPr>
+        <p:blipFill>
+          <a:blip r:embed="rId3">
+            <a:extLst>
+              <a:ext uri="{28A0092B-C50C-407E-A947-70E740481C1C}">
+                <a14:useLocalDpi xmlns:a14="http://schemas.microsoft.com/office/drawing/2010/main" val="0"/>
+              </a:ext>
+            </a:extLst>
+          </a:blip>
+          <a:stretch>
+            <a:fillRect/>
+          </a:stretch>
+        </p:blipFill>
+        <p:spPr>
+          <a:xfrm>
+            <a:off x="5248479" y="4362596"/>
+            <a:ext cx="409524" cy="323810"/>
+          </a:xfrm>
+          <a:prstGeom prst="rect">
+            <a:avLst/>
+          </a:prstGeom>
+        </p:spPr>
+      </p:pic>
+      <p:sp>
+        <p:nvSpPr>
+          <p:cNvPr id="24" name="TextBox 23">
+            <a:extLst>
+              <a:ext uri="{FF2B5EF4-FFF2-40B4-BE49-F238E27FC236}">
+                <a16:creationId xmlns:a16="http://schemas.microsoft.com/office/drawing/2014/main" id="{D7058074-B09F-696B-45D3-27652EEA54DA}"/>
+              </a:ext>
+            </a:extLst>
+          </p:cNvPr>
+          <p:cNvSpPr txBox="1"/>
+          <p:nvPr/>
+        </p:nvSpPr>
+        <p:spPr>
+          <a:xfrm>
+            <a:off x="5248478" y="4155046"/>
+            <a:ext cx="646455" cy="261610"/>
+          </a:xfrm>
+          <a:prstGeom prst="rect">
+            <a:avLst/>
+          </a:prstGeom>
+          <a:noFill/>
+        </p:spPr>
+        <p:txBody>
+          <a:bodyPr wrap="square" rtlCol="0">
+            <a:spAutoFit/>
+          </a:bodyPr>
+          <a:lstStyle/>
+          <a:p>
+            <a:r>
+              <a:rPr lang="en-US" sz="1100" b="1" dirty="0"/>
+              <a:t>HR2</a:t>
+            </a:r>
+            <a:endParaRPr lang="en-SG" sz="1100" b="1" dirty="0"/>
+          </a:p>
+        </p:txBody>
+      </p:sp>
+      <p:cxnSp>
+        <p:nvCxnSpPr>
+          <p:cNvPr id="26" name="Straight Connector 25">
+            <a:extLst>
+              <a:ext uri="{FF2B5EF4-FFF2-40B4-BE49-F238E27FC236}">
+                <a16:creationId xmlns:a16="http://schemas.microsoft.com/office/drawing/2014/main" id="{B437B06D-62EE-0EC2-01FC-C18F0A1400F3}"/>
+              </a:ext>
+            </a:extLst>
+          </p:cNvPr>
+          <p:cNvCxnSpPr>
+            <a:cxnSpLocks/>
+          </p:cNvCxnSpPr>
+          <p:nvPr/>
+        </p:nvCxnSpPr>
+        <p:spPr>
+          <a:xfrm>
+            <a:off x="5653130" y="4517210"/>
+            <a:ext cx="2265919" cy="9568"/>
+          </a:xfrm>
+          <a:prstGeom prst="line">
+            <a:avLst/>
+          </a:prstGeom>
+        </p:spPr>
+        <p:style>
+          <a:lnRef idx="2">
+            <a:schemeClr val="dk1"/>
+          </a:lnRef>
+          <a:fillRef idx="0">
+            <a:schemeClr val="dk1"/>
+          </a:fillRef>
+          <a:effectRef idx="1">
+            <a:schemeClr val="dk1"/>
+          </a:effectRef>
+          <a:fontRef idx="minor">
+            <a:schemeClr val="tx1"/>
+          </a:fontRef>
+        </p:style>
+      </p:cxnSp>
+      <p:sp>
+        <p:nvSpPr>
+          <p:cNvPr id="27" name="TextBox 26">
+            <a:extLst>
+              <a:ext uri="{FF2B5EF4-FFF2-40B4-BE49-F238E27FC236}">
+                <a16:creationId xmlns:a16="http://schemas.microsoft.com/office/drawing/2014/main" id="{67076EB1-297A-6ECC-417C-74D9500E6B7D}"/>
+              </a:ext>
+            </a:extLst>
+          </p:cNvPr>
+          <p:cNvSpPr txBox="1"/>
+          <p:nvPr/>
+        </p:nvSpPr>
+        <p:spPr>
+          <a:xfrm>
+            <a:off x="7963849" y="4381113"/>
+            <a:ext cx="294053" cy="261610"/>
+          </a:xfrm>
+          <a:prstGeom prst="rect">
+            <a:avLst/>
+          </a:prstGeom>
+          <a:noFill/>
+        </p:spPr>
+        <p:txBody>
+          <a:bodyPr wrap="square" rtlCol="0">
+            <a:spAutoFit/>
+          </a:bodyPr>
+          <a:lstStyle/>
+          <a:p>
+            <a:r>
+              <a:rPr lang="en-US" sz="1100" b="1" dirty="0"/>
+              <a:t>K</a:t>
+            </a:r>
+            <a:endParaRPr lang="en-SG" sz="1100" b="1" dirty="0"/>
+          </a:p>
+        </p:txBody>
+      </p:sp>
+      <p:sp>
+        <p:nvSpPr>
+          <p:cNvPr id="30" name="TextBox 29">
+            <a:extLst>
+              <a:ext uri="{FF2B5EF4-FFF2-40B4-BE49-F238E27FC236}">
+                <a16:creationId xmlns:a16="http://schemas.microsoft.com/office/drawing/2014/main" id="{74F5522E-1503-F545-7E28-F3D86B25CD04}"/>
+              </a:ext>
+            </a:extLst>
+          </p:cNvPr>
+          <p:cNvSpPr txBox="1"/>
+          <p:nvPr/>
+        </p:nvSpPr>
+        <p:spPr>
+          <a:xfrm>
+            <a:off x="7946477" y="5006259"/>
+            <a:ext cx="462356" cy="261610"/>
+          </a:xfrm>
+          <a:prstGeom prst="rect">
+            <a:avLst/>
+          </a:prstGeom>
+          <a:noFill/>
+        </p:spPr>
+        <p:txBody>
+          <a:bodyPr wrap="square" rtlCol="0">
+            <a:spAutoFit/>
+          </a:bodyPr>
+          <a:lstStyle/>
+          <a:p>
+            <a:r>
+              <a:rPr lang="en-US" sz="1100" b="1" dirty="0"/>
+              <a:t>CLK</a:t>
+            </a:r>
+            <a:endParaRPr lang="en-SG" sz="1100" b="1" dirty="0"/>
+          </a:p>
+        </p:txBody>
+      </p:sp>
+      <p:sp>
+        <p:nvSpPr>
+          <p:cNvPr id="33" name="TextBox 32">
+            <a:extLst>
+              <a:ext uri="{FF2B5EF4-FFF2-40B4-BE49-F238E27FC236}">
+                <a16:creationId xmlns:a16="http://schemas.microsoft.com/office/drawing/2014/main" id="{429EF9F9-681E-4588-026B-D9009A450663}"/>
+              </a:ext>
+            </a:extLst>
+          </p:cNvPr>
+          <p:cNvSpPr txBox="1"/>
+          <p:nvPr/>
+        </p:nvSpPr>
+        <p:spPr>
+          <a:xfrm>
+            <a:off x="6837666" y="4953249"/>
+            <a:ext cx="646455" cy="261610"/>
+          </a:xfrm>
+          <a:prstGeom prst="rect">
+            <a:avLst/>
+          </a:prstGeom>
+          <a:noFill/>
+        </p:spPr>
+        <p:txBody>
+          <a:bodyPr wrap="square" rtlCol="0">
+            <a:spAutoFit/>
+          </a:bodyPr>
+          <a:lstStyle/>
+          <a:p>
+            <a:r>
+              <a:rPr lang="en-US" sz="1100" b="1" dirty="0"/>
+              <a:t>TON</a:t>
+            </a:r>
+            <a:endParaRPr lang="en-SG" sz="1100" b="1" dirty="0"/>
+          </a:p>
+        </p:txBody>
+      </p:sp>
+      <p:sp>
+        <p:nvSpPr>
+          <p:cNvPr id="34" name="TextBox 33">
+            <a:extLst>
+              <a:ext uri="{FF2B5EF4-FFF2-40B4-BE49-F238E27FC236}">
+                <a16:creationId xmlns:a16="http://schemas.microsoft.com/office/drawing/2014/main" id="{E4272AA8-E827-1FA5-B899-F09CC1B022EA}"/>
+              </a:ext>
+            </a:extLst>
+          </p:cNvPr>
+          <p:cNvSpPr txBox="1"/>
+          <p:nvPr/>
+        </p:nvSpPr>
+        <p:spPr>
+          <a:xfrm>
+            <a:off x="6596497" y="4670709"/>
+            <a:ext cx="1000395" cy="261610"/>
+          </a:xfrm>
+          <a:prstGeom prst="rect">
+            <a:avLst/>
+          </a:prstGeom>
+          <a:noFill/>
+        </p:spPr>
+        <p:txBody>
+          <a:bodyPr wrap="square" rtlCol="0">
+            <a:spAutoFit/>
+          </a:bodyPr>
+          <a:lstStyle/>
+          <a:p>
+            <a:r>
+              <a:rPr lang="en-US" sz="1100" b="1" dirty="0"/>
+              <a:t>Delay Timer</a:t>
+            </a:r>
+            <a:endParaRPr lang="en-SG" sz="1100" b="1" dirty="0"/>
+          </a:p>
+        </p:txBody>
+      </p:sp>
+      <p:sp>
+        <p:nvSpPr>
+          <p:cNvPr id="37" name="TextBox 36">
+            <a:extLst>
+              <a:ext uri="{FF2B5EF4-FFF2-40B4-BE49-F238E27FC236}">
+                <a16:creationId xmlns:a16="http://schemas.microsoft.com/office/drawing/2014/main" id="{F8CC43CA-5DB2-07EB-B759-73C0E1182300}"/>
+              </a:ext>
+            </a:extLst>
+          </p:cNvPr>
+          <p:cNvSpPr txBox="1"/>
+          <p:nvPr/>
+        </p:nvSpPr>
+        <p:spPr>
+          <a:xfrm>
+            <a:off x="6771438" y="5245692"/>
+            <a:ext cx="646455" cy="430887"/>
+          </a:xfrm>
+          <a:prstGeom prst="rect">
+            <a:avLst/>
+          </a:prstGeom>
+          <a:noFill/>
+        </p:spPr>
+        <p:txBody>
+          <a:bodyPr wrap="square" rtlCol="0">
+            <a:spAutoFit/>
+          </a:bodyPr>
+          <a:lstStyle/>
+          <a:p>
+            <a:r>
+              <a:rPr lang="en-US" sz="1100" b="1" dirty="0"/>
+              <a:t>Delay (1sec)</a:t>
+            </a:r>
+            <a:endParaRPr lang="en-SG" sz="1100" b="1" dirty="0"/>
+          </a:p>
+        </p:txBody>
+      </p:sp>
+      <p:cxnSp>
+        <p:nvCxnSpPr>
+          <p:cNvPr id="40" name="Straight Connector 39">
+            <a:extLst>
+              <a:ext uri="{FF2B5EF4-FFF2-40B4-BE49-F238E27FC236}">
+                <a16:creationId xmlns:a16="http://schemas.microsoft.com/office/drawing/2014/main" id="{8674B603-61FE-AEE5-024C-457A0830A77B}"/>
+              </a:ext>
+            </a:extLst>
+          </p:cNvPr>
+          <p:cNvCxnSpPr>
+            <a:cxnSpLocks/>
+            <a:endCxn id="30" idx="1"/>
+          </p:cNvCxnSpPr>
+          <p:nvPr/>
+        </p:nvCxnSpPr>
+        <p:spPr>
+          <a:xfrm>
+            <a:off x="7506683" y="5135988"/>
+            <a:ext cx="439794" cy="1076"/>
+          </a:xfrm>
+          <a:prstGeom prst="line">
+            <a:avLst/>
+          </a:prstGeom>
+        </p:spPr>
+        <p:style>
+          <a:lnRef idx="2">
+            <a:schemeClr val="dk1"/>
+          </a:lnRef>
+          <a:fillRef idx="0">
+            <a:schemeClr val="dk1"/>
+          </a:fillRef>
+          <a:effectRef idx="1">
+            <a:schemeClr val="dk1"/>
+          </a:effectRef>
+          <a:fontRef idx="minor">
+            <a:schemeClr val="tx1"/>
+          </a:fontRef>
+        </p:style>
+      </p:cxnSp>
+      <p:sp>
+        <p:nvSpPr>
+          <p:cNvPr id="53" name="TextBox 52">
+            <a:extLst>
+              <a:ext uri="{FF2B5EF4-FFF2-40B4-BE49-F238E27FC236}">
+                <a16:creationId xmlns:a16="http://schemas.microsoft.com/office/drawing/2014/main" id="{03969500-B2BA-2894-493E-2FFCA04436A1}"/>
+              </a:ext>
+            </a:extLst>
+          </p:cNvPr>
+          <p:cNvSpPr txBox="1"/>
+          <p:nvPr/>
+        </p:nvSpPr>
+        <p:spPr>
+          <a:xfrm>
+            <a:off x="8817217" y="3872452"/>
+            <a:ext cx="294053" cy="261610"/>
+          </a:xfrm>
+          <a:prstGeom prst="rect">
+            <a:avLst/>
+          </a:prstGeom>
+          <a:noFill/>
+        </p:spPr>
+        <p:txBody>
+          <a:bodyPr wrap="square" rtlCol="0">
+            <a:spAutoFit/>
+          </a:bodyPr>
+          <a:lstStyle/>
+          <a:p>
+            <a:r>
+              <a:rPr lang="en-US" sz="1100" b="1" dirty="0"/>
+              <a:t>Q</a:t>
+            </a:r>
+            <a:endParaRPr lang="en-SG" sz="1100" b="1" dirty="0"/>
+          </a:p>
+        </p:txBody>
+      </p:sp>
+      <p:cxnSp>
+        <p:nvCxnSpPr>
+          <p:cNvPr id="54" name="Straight Connector 53">
+            <a:extLst>
+              <a:ext uri="{FF2B5EF4-FFF2-40B4-BE49-F238E27FC236}">
+                <a16:creationId xmlns:a16="http://schemas.microsoft.com/office/drawing/2014/main" id="{72331839-3830-4815-5981-61BA9EED7206}"/>
+              </a:ext>
+            </a:extLst>
+          </p:cNvPr>
+          <p:cNvCxnSpPr>
+            <a:cxnSpLocks/>
+          </p:cNvCxnSpPr>
+          <p:nvPr/>
+        </p:nvCxnSpPr>
+        <p:spPr>
+          <a:xfrm>
+            <a:off x="9075562" y="4005178"/>
+            <a:ext cx="1546601" cy="0"/>
+          </a:xfrm>
+          <a:prstGeom prst="line">
+            <a:avLst/>
+          </a:prstGeom>
+        </p:spPr>
+        <p:style>
+          <a:lnRef idx="2">
+            <a:schemeClr val="dk1"/>
+          </a:lnRef>
+          <a:fillRef idx="0">
+            <a:schemeClr val="dk1"/>
+          </a:fillRef>
+          <a:effectRef idx="1">
+            <a:schemeClr val="dk1"/>
+          </a:effectRef>
+          <a:fontRef idx="minor">
+            <a:schemeClr val="tx1"/>
+          </a:fontRef>
+        </p:style>
+      </p:cxnSp>
+      <p:pic>
+        <p:nvPicPr>
+          <p:cNvPr id="55" name="Picture 54">
+            <a:extLst>
+              <a:ext uri="{FF2B5EF4-FFF2-40B4-BE49-F238E27FC236}">
+                <a16:creationId xmlns:a16="http://schemas.microsoft.com/office/drawing/2014/main" id="{8EF7A86D-67DF-9AD6-C293-A95A5E8D8F96}"/>
+              </a:ext>
+            </a:extLst>
+          </p:cNvPr>
+          <p:cNvPicPr>
+            <a:picLocks noChangeAspect="1"/>
+          </p:cNvPicPr>
+          <p:nvPr/>
+        </p:nvPicPr>
+        <p:blipFill>
+          <a:blip r:embed="rId4">
+            <a:extLst>
+              <a:ext uri="{28A0092B-C50C-407E-A947-70E740481C1C}">
+                <a14:useLocalDpi xmlns:a14="http://schemas.microsoft.com/office/drawing/2010/main" val="0"/>
+              </a:ext>
+            </a:extLst>
+          </a:blip>
+          <a:stretch>
+            <a:fillRect/>
+          </a:stretch>
+        </p:blipFill>
+        <p:spPr>
+          <a:xfrm>
+            <a:off x="10644581" y="3840733"/>
+            <a:ext cx="438095" cy="342857"/>
+          </a:xfrm>
+          <a:prstGeom prst="rect">
+            <a:avLst/>
+          </a:prstGeom>
+        </p:spPr>
+      </p:pic>
+      <p:sp>
+        <p:nvSpPr>
+          <p:cNvPr id="56" name="TextBox 55">
+            <a:extLst>
+              <a:ext uri="{FF2B5EF4-FFF2-40B4-BE49-F238E27FC236}">
+                <a16:creationId xmlns:a16="http://schemas.microsoft.com/office/drawing/2014/main" id="{688C2677-D09D-FA82-F08D-93C045921368}"/>
+              </a:ext>
+            </a:extLst>
+          </p:cNvPr>
+          <p:cNvSpPr txBox="1"/>
+          <p:nvPr/>
+        </p:nvSpPr>
+        <p:spPr>
+          <a:xfrm>
+            <a:off x="10668435" y="3644753"/>
+            <a:ext cx="646455" cy="261610"/>
+          </a:xfrm>
+          <a:prstGeom prst="rect">
+            <a:avLst/>
+          </a:prstGeom>
+          <a:noFill/>
+        </p:spPr>
+        <p:txBody>
+          <a:bodyPr wrap="square" rtlCol="0">
+            <a:spAutoFit/>
+          </a:bodyPr>
+          <a:lstStyle/>
+          <a:p>
+            <a:r>
+              <a:rPr lang="en-US" sz="1100" b="1" dirty="0"/>
+              <a:t>C0</a:t>
+            </a:r>
+            <a:endParaRPr lang="en-SG" sz="1100" b="1" dirty="0"/>
+          </a:p>
+        </p:txBody>
+      </p:sp>
+      <p:pic>
+        <p:nvPicPr>
+          <p:cNvPr id="57" name="Picture 56">
+            <a:extLst>
+              <a:ext uri="{FF2B5EF4-FFF2-40B4-BE49-F238E27FC236}">
+                <a16:creationId xmlns:a16="http://schemas.microsoft.com/office/drawing/2014/main" id="{F0AA4471-C273-0DB6-45B7-B09D1ECCE202}"/>
+              </a:ext>
+            </a:extLst>
+          </p:cNvPr>
+          <p:cNvPicPr>
+            <a:picLocks noChangeAspect="1"/>
+          </p:cNvPicPr>
+          <p:nvPr/>
+        </p:nvPicPr>
+        <p:blipFill>
+          <a:blip r:embed="rId3">
+            <a:extLst>
+              <a:ext uri="{28A0092B-C50C-407E-A947-70E740481C1C}">
+                <a14:useLocalDpi xmlns:a14="http://schemas.microsoft.com/office/drawing/2010/main" val="0"/>
+              </a:ext>
+            </a:extLst>
+          </a:blip>
+          <a:stretch>
+            <a:fillRect/>
+          </a:stretch>
+        </p:blipFill>
+        <p:spPr>
+          <a:xfrm>
+            <a:off x="6170937" y="4974083"/>
+            <a:ext cx="409524" cy="323810"/>
+          </a:xfrm>
+          <a:prstGeom prst="rect">
+            <a:avLst/>
+          </a:prstGeom>
+        </p:spPr>
+      </p:pic>
+      <p:cxnSp>
+        <p:nvCxnSpPr>
+          <p:cNvPr id="63" name="Straight Connector 62">
+            <a:extLst>
+              <a:ext uri="{FF2B5EF4-FFF2-40B4-BE49-F238E27FC236}">
+                <a16:creationId xmlns:a16="http://schemas.microsoft.com/office/drawing/2014/main" id="{6D679EC7-DCF2-80E8-A219-3E74F3F9662A}"/>
+              </a:ext>
+            </a:extLst>
+          </p:cNvPr>
+          <p:cNvCxnSpPr>
+            <a:cxnSpLocks/>
+          </p:cNvCxnSpPr>
+          <p:nvPr/>
+        </p:nvCxnSpPr>
+        <p:spPr>
+          <a:xfrm>
+            <a:off x="6566309" y="5135988"/>
+            <a:ext cx="97841" cy="0"/>
+          </a:xfrm>
+          <a:prstGeom prst="line">
+            <a:avLst/>
+          </a:prstGeom>
+        </p:spPr>
+        <p:style>
+          <a:lnRef idx="2">
+            <a:schemeClr val="dk1"/>
+          </a:lnRef>
+          <a:fillRef idx="0">
+            <a:schemeClr val="dk1"/>
+          </a:fillRef>
+          <a:effectRef idx="1">
+            <a:schemeClr val="dk1"/>
+          </a:effectRef>
+          <a:fontRef idx="minor">
+            <a:schemeClr val="tx1"/>
+          </a:fontRef>
+        </p:style>
+      </p:cxnSp>
+      <p:sp>
+        <p:nvSpPr>
+          <p:cNvPr id="32" name="Rectangle 31">
+            <a:extLst>
+              <a:ext uri="{FF2B5EF4-FFF2-40B4-BE49-F238E27FC236}">
+                <a16:creationId xmlns:a16="http://schemas.microsoft.com/office/drawing/2014/main" id="{93190EA7-F8FF-E981-5EE4-1196EDF04923}"/>
+              </a:ext>
+            </a:extLst>
+          </p:cNvPr>
+          <p:cNvSpPr/>
+          <p:nvPr/>
+        </p:nvSpPr>
+        <p:spPr>
+          <a:xfrm>
+            <a:off x="6664150" y="4957332"/>
+            <a:ext cx="840547" cy="871959"/>
+          </a:xfrm>
+          <a:prstGeom prst="rect">
+            <a:avLst/>
+          </a:prstGeom>
+          <a:noFill/>
+        </p:spPr>
+        <p:style>
+          <a:lnRef idx="2">
+            <a:schemeClr val="accent1">
+              <a:shade val="15000"/>
+            </a:schemeClr>
+          </a:lnRef>
+          <a:fillRef idx="1">
+            <a:schemeClr val="accent1"/>
+          </a:fillRef>
+          <a:effectRef idx="0">
+            <a:schemeClr val="accent1"/>
+          </a:effectRef>
+          <a:fontRef idx="minor">
+            <a:schemeClr val="lt1"/>
+          </a:fontRef>
+        </p:style>
+        <p:txBody>
+          <a:bodyPr rtlCol="0" anchor="ctr"/>
+          <a:lstStyle/>
+          <a:p>
+            <a:pPr algn="ctr"/>
+            <a:endParaRPr lang="en-SG" dirty="0"/>
+          </a:p>
+        </p:txBody>
+      </p:sp>
+      <p:sp>
+        <p:nvSpPr>
+          <p:cNvPr id="65" name="TextBox 64">
+            <a:extLst>
+              <a:ext uri="{FF2B5EF4-FFF2-40B4-BE49-F238E27FC236}">
+                <a16:creationId xmlns:a16="http://schemas.microsoft.com/office/drawing/2014/main" id="{35492DAA-AD0B-FB00-DA51-5524548DA2F7}"/>
+              </a:ext>
+            </a:extLst>
+          </p:cNvPr>
+          <p:cNvSpPr txBox="1"/>
+          <p:nvPr/>
+        </p:nvSpPr>
+        <p:spPr>
+          <a:xfrm>
+            <a:off x="6115720" y="4713464"/>
+            <a:ext cx="646455" cy="261610"/>
+          </a:xfrm>
+          <a:prstGeom prst="rect">
+            <a:avLst/>
+          </a:prstGeom>
+          <a:noFill/>
+        </p:spPr>
+        <p:txBody>
+          <a:bodyPr wrap="square" rtlCol="0">
+            <a:spAutoFit/>
+          </a:bodyPr>
+          <a:lstStyle/>
+          <a:p>
+            <a:r>
+              <a:rPr lang="en-US" sz="1100" b="1" dirty="0"/>
+              <a:t>HR3</a:t>
+            </a:r>
+            <a:endParaRPr lang="en-SG" sz="1100" b="1" dirty="0"/>
+          </a:p>
+        </p:txBody>
+      </p:sp>
     </p:spTree>
     <p:extLst>
       <p:ext uri="{BB962C8B-B14F-4D97-AF65-F5344CB8AC3E}">

</xml_diff>